<commit_message>
docs/progress.pptx: long overdue progress
Signed-off-by: Jinghao Jia <jinghao7@illinois.edu>
</commit_message>
<xml_diff>
--- a/docs/progress.pptx
+++ b/docs/progress.pptx
@@ -5,7 +5,7 @@
     <p:sldMasterId id="2147483648" r:id="rId1"/>
   </p:sldMasterIdLst>
   <p:notesMasterIdLst>
-    <p:notesMasterId r:id="rId19"/>
+    <p:notesMasterId r:id="rId29"/>
   </p:notesMasterIdLst>
   <p:sldIdLst>
     <p:sldId id="256" r:id="rId2"/>
@@ -25,6 +25,16 @@
     <p:sldId id="271" r:id="rId16"/>
     <p:sldId id="272" r:id="rId17"/>
     <p:sldId id="273" r:id="rId18"/>
+    <p:sldId id="275" r:id="rId19"/>
+    <p:sldId id="274" r:id="rId20"/>
+    <p:sldId id="276" r:id="rId21"/>
+    <p:sldId id="277" r:id="rId22"/>
+    <p:sldId id="278" r:id="rId23"/>
+    <p:sldId id="280" r:id="rId24"/>
+    <p:sldId id="279" r:id="rId25"/>
+    <p:sldId id="281" r:id="rId26"/>
+    <p:sldId id="282" r:id="rId27"/>
+    <p:sldId id="283" r:id="rId28"/>
   </p:sldIdLst>
   <p:sldSz cx="12192000" cy="6858000"/>
   <p:notesSz cx="6858000" cy="9144000"/>
@@ -213,7 +223,7 @@
           <a:p>
             <a:fld id="{61FCE3FB-CB61-C74A-B02F-BB578FE0824B}" type="datetimeFigureOut">
               <a:rPr lang="en-US" smtClean="0"/>
-              <a:t>2/23/23</a:t>
+              <a:t>4/6/23</a:t>
             </a:fld>
             <a:endParaRPr lang="en-US"/>
           </a:p>
@@ -728,7 +738,7 @@
           <a:p>
             <a:fld id="{F9719763-85D6-3E47-9685-BADF73EB501A}" type="datetimeFigureOut">
               <a:rPr lang="en-US" smtClean="0"/>
-              <a:t>2/23/23</a:t>
+              <a:t>4/6/23</a:t>
             </a:fld>
             <a:endParaRPr lang="en-US"/>
           </a:p>
@@ -926,7 +936,7 @@
           <a:p>
             <a:fld id="{F9719763-85D6-3E47-9685-BADF73EB501A}" type="datetimeFigureOut">
               <a:rPr lang="en-US" smtClean="0"/>
-              <a:t>2/23/23</a:t>
+              <a:t>4/6/23</a:t>
             </a:fld>
             <a:endParaRPr lang="en-US"/>
           </a:p>
@@ -1134,7 +1144,7 @@
           <a:p>
             <a:fld id="{F9719763-85D6-3E47-9685-BADF73EB501A}" type="datetimeFigureOut">
               <a:rPr lang="en-US" smtClean="0"/>
-              <a:t>2/23/23</a:t>
+              <a:t>4/6/23</a:t>
             </a:fld>
             <a:endParaRPr lang="en-US"/>
           </a:p>
@@ -1332,7 +1342,7 @@
           <a:p>
             <a:fld id="{F9719763-85D6-3E47-9685-BADF73EB501A}" type="datetimeFigureOut">
               <a:rPr lang="en-US" smtClean="0"/>
-              <a:t>2/23/23</a:t>
+              <a:t>4/6/23</a:t>
             </a:fld>
             <a:endParaRPr lang="en-US"/>
           </a:p>
@@ -1607,7 +1617,7 @@
           <a:p>
             <a:fld id="{F9719763-85D6-3E47-9685-BADF73EB501A}" type="datetimeFigureOut">
               <a:rPr lang="en-US" smtClean="0"/>
-              <a:t>2/23/23</a:t>
+              <a:t>4/6/23</a:t>
             </a:fld>
             <a:endParaRPr lang="en-US"/>
           </a:p>
@@ -1872,7 +1882,7 @@
           <a:p>
             <a:fld id="{F9719763-85D6-3E47-9685-BADF73EB501A}" type="datetimeFigureOut">
               <a:rPr lang="en-US" smtClean="0"/>
-              <a:t>2/23/23</a:t>
+              <a:t>4/6/23</a:t>
             </a:fld>
             <a:endParaRPr lang="en-US"/>
           </a:p>
@@ -2284,7 +2294,7 @@
           <a:p>
             <a:fld id="{F9719763-85D6-3E47-9685-BADF73EB501A}" type="datetimeFigureOut">
               <a:rPr lang="en-US" smtClean="0"/>
-              <a:t>2/23/23</a:t>
+              <a:t>4/6/23</a:t>
             </a:fld>
             <a:endParaRPr lang="en-US"/>
           </a:p>
@@ -2425,7 +2435,7 @@
           <a:p>
             <a:fld id="{F9719763-85D6-3E47-9685-BADF73EB501A}" type="datetimeFigureOut">
               <a:rPr lang="en-US" smtClean="0"/>
-              <a:t>2/23/23</a:t>
+              <a:t>4/6/23</a:t>
             </a:fld>
             <a:endParaRPr lang="en-US"/>
           </a:p>
@@ -2538,7 +2548,7 @@
           <a:p>
             <a:fld id="{F9719763-85D6-3E47-9685-BADF73EB501A}" type="datetimeFigureOut">
               <a:rPr lang="en-US" smtClean="0"/>
-              <a:t>2/23/23</a:t>
+              <a:t>4/6/23</a:t>
             </a:fld>
             <a:endParaRPr lang="en-US"/>
           </a:p>
@@ -2849,7 +2859,7 @@
           <a:p>
             <a:fld id="{F9719763-85D6-3E47-9685-BADF73EB501A}" type="datetimeFigureOut">
               <a:rPr lang="en-US" smtClean="0"/>
-              <a:t>2/23/23</a:t>
+              <a:t>4/6/23</a:t>
             </a:fld>
             <a:endParaRPr lang="en-US"/>
           </a:p>
@@ -3137,7 +3147,7 @@
           <a:p>
             <a:fld id="{F9719763-85D6-3E47-9685-BADF73EB501A}" type="datetimeFigureOut">
               <a:rPr lang="en-US" smtClean="0"/>
-              <a:t>2/23/23</a:t>
+              <a:t>4/6/23</a:t>
             </a:fld>
             <a:endParaRPr lang="en-US"/>
           </a:p>
@@ -3378,7 +3388,7 @@
           <a:p>
             <a:fld id="{F9719763-85D6-3E47-9685-BADF73EB501A}" type="datetimeFigureOut">
               <a:rPr lang="en-US" smtClean="0"/>
-              <a:t>2/23/23</a:t>
+              <a:t>4/6/23</a:t>
             </a:fld>
             <a:endParaRPr lang="en-US"/>
           </a:p>
@@ -5366,6 +5376,349 @@
 </p:sld>
 </file>
 
+<file path=ppt/slides/slide18.xml><?xml version="1.0" encoding="utf-8"?>
+<p:sld xmlns:a="http://schemas.openxmlformats.org/drawingml/2006/main" xmlns:r="http://schemas.openxmlformats.org/officeDocument/2006/relationships" xmlns:p="http://schemas.openxmlformats.org/presentationml/2006/main">
+  <p:cSld>
+    <p:spTree>
+      <p:nvGrpSpPr>
+        <p:cNvPr id="1" name=""/>
+        <p:cNvGrpSpPr/>
+        <p:nvPr/>
+      </p:nvGrpSpPr>
+      <p:grpSpPr>
+        <a:xfrm>
+          <a:off x="0" y="0"/>
+          <a:ext cx="0" cy="0"/>
+          <a:chOff x="0" y="0"/>
+          <a:chExt cx="0" cy="0"/>
+        </a:xfrm>
+      </p:grpSpPr>
+      <p:sp>
+        <p:nvSpPr>
+          <p:cNvPr id="2" name="Title 1">
+            <a:extLst>
+              <a:ext uri="{FF2B5EF4-FFF2-40B4-BE49-F238E27FC236}">
+                <a16:creationId xmlns:a16="http://schemas.microsoft.com/office/drawing/2014/main" id="{FBBA1676-DE42-241C-E7E0-A57C6300BDCD}"/>
+              </a:ext>
+            </a:extLst>
+          </p:cNvPr>
+          <p:cNvSpPr>
+            <a:spLocks noGrp="1"/>
+          </p:cNvSpPr>
+          <p:nvPr>
+            <p:ph type="ctrTitle"/>
+          </p:nvPr>
+        </p:nvSpPr>
+        <p:spPr/>
+        <p:txBody>
+          <a:bodyPr/>
+          <a:lstStyle/>
+          <a:p>
+            <a:r>
+              <a:rPr lang="en-US" dirty="0"/>
+              <a:t>Progress 20230323</a:t>
+            </a:r>
+          </a:p>
+        </p:txBody>
+      </p:sp>
+      <p:sp>
+        <p:nvSpPr>
+          <p:cNvPr id="3" name="Subtitle 2">
+            <a:extLst>
+              <a:ext uri="{FF2B5EF4-FFF2-40B4-BE49-F238E27FC236}">
+                <a16:creationId xmlns:a16="http://schemas.microsoft.com/office/drawing/2014/main" id="{CCD6770C-019D-4FBB-FDD6-3C357BD439AB}"/>
+              </a:ext>
+            </a:extLst>
+          </p:cNvPr>
+          <p:cNvSpPr>
+            <a:spLocks noGrp="1"/>
+          </p:cNvSpPr>
+          <p:nvPr>
+            <p:ph type="subTitle" idx="1"/>
+          </p:nvPr>
+        </p:nvSpPr>
+        <p:spPr/>
+        <p:txBody>
+          <a:bodyPr/>
+          <a:lstStyle/>
+          <a:p>
+            <a:endParaRPr lang="en-US"/>
+          </a:p>
+        </p:txBody>
+      </p:sp>
+    </p:spTree>
+    <p:extLst>
+      <p:ext uri="{BB962C8B-B14F-4D97-AF65-F5344CB8AC3E}">
+        <p14:creationId xmlns:p14="http://schemas.microsoft.com/office/powerpoint/2010/main" val="1893664818"/>
+      </p:ext>
+    </p:extLst>
+  </p:cSld>
+  <p:clrMapOvr>
+    <a:masterClrMapping/>
+  </p:clrMapOvr>
+</p:sld>
+</file>
+
+<file path=ppt/slides/slide19.xml><?xml version="1.0" encoding="utf-8"?>
+<p:sld xmlns:a="http://schemas.openxmlformats.org/drawingml/2006/main" xmlns:r="http://schemas.openxmlformats.org/officeDocument/2006/relationships" xmlns:p="http://schemas.openxmlformats.org/presentationml/2006/main">
+  <p:cSld>
+    <p:spTree>
+      <p:nvGrpSpPr>
+        <p:cNvPr id="1" name=""/>
+        <p:cNvGrpSpPr/>
+        <p:nvPr/>
+      </p:nvGrpSpPr>
+      <p:grpSpPr>
+        <a:xfrm>
+          <a:off x="0" y="0"/>
+          <a:ext cx="0" cy="0"/>
+          <a:chOff x="0" y="0"/>
+          <a:chExt cx="0" cy="0"/>
+        </a:xfrm>
+      </p:grpSpPr>
+      <p:sp>
+        <p:nvSpPr>
+          <p:cNvPr id="2" name="Title 1">
+            <a:extLst>
+              <a:ext uri="{FF2B5EF4-FFF2-40B4-BE49-F238E27FC236}">
+                <a16:creationId xmlns:a16="http://schemas.microsoft.com/office/drawing/2014/main" id="{F2CFB670-FD26-3C60-71B7-148CFEF2F84F}"/>
+              </a:ext>
+            </a:extLst>
+          </p:cNvPr>
+          <p:cNvSpPr>
+            <a:spLocks noGrp="1"/>
+          </p:cNvSpPr>
+          <p:nvPr>
+            <p:ph type="title"/>
+          </p:nvPr>
+        </p:nvSpPr>
+        <p:spPr/>
+        <p:txBody>
+          <a:bodyPr/>
+          <a:lstStyle/>
+          <a:p>
+            <a:r>
+              <a:rPr lang="en-US" dirty="0"/>
+              <a:t>Progress</a:t>
+            </a:r>
+          </a:p>
+        </p:txBody>
+      </p:sp>
+      <p:sp>
+        <p:nvSpPr>
+          <p:cNvPr id="3" name="Content Placeholder 2">
+            <a:extLst>
+              <a:ext uri="{FF2B5EF4-FFF2-40B4-BE49-F238E27FC236}">
+                <a16:creationId xmlns:a16="http://schemas.microsoft.com/office/drawing/2014/main" id="{E82DE558-AA83-22F5-2619-B7E0820D8437}"/>
+              </a:ext>
+            </a:extLst>
+          </p:cNvPr>
+          <p:cNvSpPr>
+            <a:spLocks noGrp="1"/>
+          </p:cNvSpPr>
+          <p:nvPr>
+            <p:ph idx="1"/>
+          </p:nvPr>
+        </p:nvSpPr>
+        <p:spPr/>
+        <p:txBody>
+          <a:bodyPr/>
+          <a:lstStyle/>
+          <a:p>
+            <a:r>
+              <a:rPr lang="en-US" dirty="0"/>
+              <a:t>More helpers</a:t>
+            </a:r>
+          </a:p>
+          <a:p>
+            <a:pPr lvl="1"/>
+            <a:r>
+              <a:rPr lang="en-US" sz="2200" dirty="0" err="1">
+                <a:latin typeface="Consolas" panose="020B0609020204030204" pitchFamily="49" charset="0"/>
+                <a:cs typeface="Consolas" panose="020B0609020204030204" pitchFamily="49" charset="0"/>
+              </a:rPr>
+              <a:t>get_current_task</a:t>
+            </a:r>
+            <a:r>
+              <a:rPr lang="en-US" sz="2200" dirty="0">
+                <a:latin typeface="Consolas" panose="020B0609020204030204" pitchFamily="49" charset="0"/>
+                <a:cs typeface="Consolas" panose="020B0609020204030204" pitchFamily="49" charset="0"/>
+              </a:rPr>
+              <a:t> (per-</a:t>
+            </a:r>
+            <a:r>
+              <a:rPr lang="en-US" sz="2200" dirty="0" err="1">
+                <a:latin typeface="Consolas" panose="020B0609020204030204" pitchFamily="49" charset="0"/>
+                <a:cs typeface="Consolas" panose="020B0609020204030204" pitchFamily="49" charset="0"/>
+              </a:rPr>
+              <a:t>cpu</a:t>
+            </a:r>
+            <a:r>
+              <a:rPr lang="en-US" sz="2200" dirty="0">
+                <a:latin typeface="Consolas" panose="020B0609020204030204" pitchFamily="49" charset="0"/>
+                <a:cs typeface="Consolas" panose="020B0609020204030204" pitchFamily="49" charset="0"/>
+              </a:rPr>
+              <a:t> access kernel obj)</a:t>
+            </a:r>
+          </a:p>
+          <a:p>
+            <a:pPr lvl="1"/>
+            <a:r>
+              <a:rPr lang="en-US" sz="2200" dirty="0" err="1">
+                <a:latin typeface="Consolas" panose="020B0609020204030204" pitchFamily="49" charset="0"/>
+                <a:cs typeface="Consolas" panose="020B0609020204030204" pitchFamily="49" charset="0"/>
+              </a:rPr>
+              <a:t>get_current_pid_tgid</a:t>
+            </a:r>
+            <a:endParaRPr lang="en-US" sz="2200" dirty="0">
+              <a:latin typeface="Consolas" panose="020B0609020204030204" pitchFamily="49" charset="0"/>
+              <a:cs typeface="Consolas" panose="020B0609020204030204" pitchFamily="49" charset="0"/>
+            </a:endParaRPr>
+          </a:p>
+          <a:p>
+            <a:pPr lvl="1"/>
+            <a:r>
+              <a:rPr lang="en-US" sz="2200" dirty="0" err="1">
+                <a:latin typeface="Consolas" panose="020B0609020204030204" pitchFamily="49" charset="0"/>
+                <a:cs typeface="Consolas" panose="020B0609020204030204" pitchFamily="49" charset="0"/>
+              </a:rPr>
+              <a:t>get_current_comm</a:t>
+            </a:r>
+            <a:endParaRPr lang="en-US" sz="2200" dirty="0">
+              <a:latin typeface="Consolas" panose="020B0609020204030204" pitchFamily="49" charset="0"/>
+              <a:cs typeface="Consolas" panose="020B0609020204030204" pitchFamily="49" charset="0"/>
+            </a:endParaRPr>
+          </a:p>
+          <a:p>
+            <a:pPr lvl="1"/>
+            <a:r>
+              <a:rPr lang="en-US" sz="2200" dirty="0" err="1">
+                <a:latin typeface="Consolas" panose="020B0609020204030204" pitchFamily="49" charset="0"/>
+                <a:cs typeface="Consolas" panose="020B0609020204030204" pitchFamily="49" charset="0"/>
+              </a:rPr>
+              <a:t>get_smp_processor_id</a:t>
+            </a:r>
+            <a:r>
+              <a:rPr lang="en-US" sz="2200" dirty="0">
+                <a:latin typeface="Consolas" panose="020B0609020204030204" pitchFamily="49" charset="0"/>
+                <a:cs typeface="Consolas" panose="020B0609020204030204" pitchFamily="49" charset="0"/>
+              </a:rPr>
+              <a:t> (per-</a:t>
+            </a:r>
+            <a:r>
+              <a:rPr lang="en-US" sz="2200" dirty="0" err="1">
+                <a:latin typeface="Consolas" panose="020B0609020204030204" pitchFamily="49" charset="0"/>
+                <a:cs typeface="Consolas" panose="020B0609020204030204" pitchFamily="49" charset="0"/>
+              </a:rPr>
+              <a:t>cpu</a:t>
+            </a:r>
+            <a:r>
+              <a:rPr lang="en-US" sz="2200" dirty="0">
+                <a:latin typeface="Consolas" panose="020B0609020204030204" pitchFamily="49" charset="0"/>
+                <a:cs typeface="Consolas" panose="020B0609020204030204" pitchFamily="49" charset="0"/>
+              </a:rPr>
+              <a:t> access kernel obj)</a:t>
+            </a:r>
+          </a:p>
+          <a:p>
+            <a:pPr lvl="1"/>
+            <a:r>
+              <a:rPr lang="en-US" sz="2200" dirty="0" err="1">
+                <a:latin typeface="Consolas" panose="020B0609020204030204" pitchFamily="49" charset="0"/>
+                <a:cs typeface="Consolas" panose="020B0609020204030204" pitchFamily="49" charset="0"/>
+              </a:rPr>
+              <a:t>get_numa_node_id</a:t>
+            </a:r>
+            <a:r>
+              <a:rPr lang="en-US" sz="2200" dirty="0">
+                <a:latin typeface="Consolas" panose="020B0609020204030204" pitchFamily="49" charset="0"/>
+                <a:cs typeface="Consolas" panose="020B0609020204030204" pitchFamily="49" charset="0"/>
+              </a:rPr>
+              <a:t> (per-</a:t>
+            </a:r>
+            <a:r>
+              <a:rPr lang="en-US" sz="2200" dirty="0" err="1">
+                <a:latin typeface="Consolas" panose="020B0609020204030204" pitchFamily="49" charset="0"/>
+                <a:cs typeface="Consolas" panose="020B0609020204030204" pitchFamily="49" charset="0"/>
+              </a:rPr>
+              <a:t>cpu</a:t>
+            </a:r>
+            <a:r>
+              <a:rPr lang="en-US" sz="2200" dirty="0">
+                <a:latin typeface="Consolas" panose="020B0609020204030204" pitchFamily="49" charset="0"/>
+                <a:cs typeface="Consolas" panose="020B0609020204030204" pitchFamily="49" charset="0"/>
+              </a:rPr>
+              <a:t> access kernel obj)</a:t>
+            </a:r>
+          </a:p>
+          <a:p>
+            <a:pPr lvl="1"/>
+            <a:r>
+              <a:rPr lang="en-US" sz="2200" dirty="0">
+                <a:latin typeface="Consolas" panose="020B0609020204030204" pitchFamily="49" charset="0"/>
+                <a:cs typeface="Consolas" panose="020B0609020204030204" pitchFamily="49" charset="0"/>
+              </a:rPr>
+              <a:t>jiffies64</a:t>
+            </a:r>
+          </a:p>
+          <a:p>
+            <a:r>
+              <a:rPr lang="en-US" dirty="0">
+                <a:cs typeface="Consolas" panose="020B0609020204030204" pitchFamily="49" charset="0"/>
+              </a:rPr>
+              <a:t>Kernel per-</a:t>
+            </a:r>
+            <a:r>
+              <a:rPr lang="en-US" dirty="0" err="1">
+                <a:cs typeface="Consolas" panose="020B0609020204030204" pitchFamily="49" charset="0"/>
+              </a:rPr>
+              <a:t>cpu</a:t>
+            </a:r>
+            <a:r>
+              <a:rPr lang="en-US" dirty="0">
+                <a:cs typeface="Consolas" panose="020B0609020204030204" pitchFamily="49" charset="0"/>
+              </a:rPr>
+              <a:t> variables</a:t>
+            </a:r>
+          </a:p>
+          <a:p>
+            <a:r>
+              <a:rPr lang="en-US" sz="2600" dirty="0" err="1">
+                <a:latin typeface="Consolas" panose="020B0609020204030204" pitchFamily="49" charset="0"/>
+                <a:cs typeface="Consolas" panose="020B0609020204030204" pitchFamily="49" charset="0"/>
+              </a:rPr>
+              <a:t>task_struct</a:t>
+            </a:r>
+            <a:r>
+              <a:rPr lang="en-US" dirty="0">
+                <a:cs typeface="Consolas" panose="020B0609020204030204" pitchFamily="49" charset="0"/>
+              </a:rPr>
+              <a:t> bindings</a:t>
+            </a:r>
+          </a:p>
+          <a:p>
+            <a:r>
+              <a:rPr lang="en-US" dirty="0">
+                <a:cs typeface="Consolas" panose="020B0609020204030204" pitchFamily="49" charset="0"/>
+              </a:rPr>
+              <a:t>Static analysis code</a:t>
+            </a:r>
+          </a:p>
+        </p:txBody>
+      </p:sp>
+    </p:spTree>
+    <p:extLst>
+      <p:ext uri="{BB962C8B-B14F-4D97-AF65-F5344CB8AC3E}">
+        <p14:creationId xmlns:p14="http://schemas.microsoft.com/office/powerpoint/2010/main" val="3742604082"/>
+      </p:ext>
+    </p:extLst>
+  </p:cSld>
+  <p:clrMapOvr>
+    <a:masterClrMapping/>
+  </p:clrMapOvr>
+</p:sld>
+</file>
+
 <file path=ppt/slides/slide2.xml><?xml version="1.0" encoding="utf-8"?>
 <p:sld xmlns:a="http://schemas.openxmlformats.org/drawingml/2006/main" xmlns:r="http://schemas.openxmlformats.org/officeDocument/2006/relationships" xmlns:p="http://schemas.openxmlformats.org/presentationml/2006/main">
   <p:cSld>
@@ -5981,6 +6334,2109 @@
       <p:bldP spid="11" grpId="0" animBg="1"/>
     </p:bldLst>
   </p:timing>
+</p:sld>
+</file>
+
+<file path=ppt/slides/slide20.xml><?xml version="1.0" encoding="utf-8"?>
+<p:sld xmlns:a="http://schemas.openxmlformats.org/drawingml/2006/main" xmlns:r="http://schemas.openxmlformats.org/officeDocument/2006/relationships" xmlns:p="http://schemas.openxmlformats.org/presentationml/2006/main">
+  <p:cSld>
+    <p:spTree>
+      <p:nvGrpSpPr>
+        <p:cNvPr id="1" name=""/>
+        <p:cNvGrpSpPr/>
+        <p:nvPr/>
+      </p:nvGrpSpPr>
+      <p:grpSpPr>
+        <a:xfrm>
+          <a:off x="0" y="0"/>
+          <a:ext cx="0" cy="0"/>
+          <a:chOff x="0" y="0"/>
+          <a:chExt cx="0" cy="0"/>
+        </a:xfrm>
+      </p:grpSpPr>
+      <p:sp>
+        <p:nvSpPr>
+          <p:cNvPr id="2" name="Title 1">
+            <a:extLst>
+              <a:ext uri="{FF2B5EF4-FFF2-40B4-BE49-F238E27FC236}">
+                <a16:creationId xmlns:a16="http://schemas.microsoft.com/office/drawing/2014/main" id="{966CE9E8-B819-5069-00CA-64AA29BABDB8}"/>
+              </a:ext>
+            </a:extLst>
+          </p:cNvPr>
+          <p:cNvSpPr>
+            <a:spLocks noGrp="1"/>
+          </p:cNvSpPr>
+          <p:nvPr>
+            <p:ph type="title"/>
+          </p:nvPr>
+        </p:nvSpPr>
+        <p:spPr/>
+        <p:txBody>
+          <a:bodyPr/>
+          <a:lstStyle/>
+          <a:p>
+            <a:r>
+              <a:rPr lang="en-US" dirty="0"/>
+              <a:t>Per-</a:t>
+            </a:r>
+            <a:r>
+              <a:rPr lang="en-US" dirty="0" err="1"/>
+              <a:t>cpu</a:t>
+            </a:r>
+            <a:r>
+              <a:rPr lang="en-US" dirty="0"/>
+              <a:t> definitions</a:t>
+            </a:r>
+          </a:p>
+        </p:txBody>
+      </p:sp>
+      <p:sp>
+        <p:nvSpPr>
+          <p:cNvPr id="3" name="Content Placeholder 2">
+            <a:extLst>
+              <a:ext uri="{FF2B5EF4-FFF2-40B4-BE49-F238E27FC236}">
+                <a16:creationId xmlns:a16="http://schemas.microsoft.com/office/drawing/2014/main" id="{F486CDAD-D4D3-B4D8-1C44-A666F71F6789}"/>
+              </a:ext>
+            </a:extLst>
+          </p:cNvPr>
+          <p:cNvSpPr>
+            <a:spLocks noGrp="1"/>
+          </p:cNvSpPr>
+          <p:nvPr>
+            <p:ph idx="1"/>
+          </p:nvPr>
+        </p:nvSpPr>
+        <p:spPr>
+          <a:xfrm>
+            <a:off x="838200" y="1825625"/>
+            <a:ext cx="6256564" cy="4351338"/>
+          </a:xfrm>
+        </p:spPr>
+        <p:txBody>
+          <a:bodyPr>
+            <a:normAutofit lnSpcReduction="10000"/>
+          </a:bodyPr>
+          <a:lstStyle/>
+          <a:p>
+            <a:r>
+              <a:rPr lang="en-US" dirty="0"/>
+              <a:t>Some variables in the kernel has one copy per CPU</a:t>
+            </a:r>
+          </a:p>
+          <a:p>
+            <a:pPr lvl="1"/>
+            <a:r>
+              <a:rPr lang="en-US" dirty="0"/>
+              <a:t>e.g., </a:t>
+            </a:r>
+            <a:r>
+              <a:rPr lang="en-US" dirty="0" err="1"/>
+              <a:t>current_task</a:t>
+            </a:r>
+            <a:endParaRPr lang="en-US" dirty="0"/>
+          </a:p>
+          <a:p>
+            <a:r>
+              <a:rPr lang="en-US" dirty="0"/>
+              <a:t>Several helpers access per-</a:t>
+            </a:r>
+            <a:r>
+              <a:rPr lang="en-US" dirty="0" err="1"/>
+              <a:t>cpu</a:t>
+            </a:r>
+            <a:r>
+              <a:rPr lang="en-US" dirty="0"/>
+              <a:t> variables</a:t>
+            </a:r>
+          </a:p>
+          <a:p>
+            <a:pPr lvl="1"/>
+            <a:r>
+              <a:rPr lang="en-US" dirty="0"/>
+              <a:t>e.g., </a:t>
+            </a:r>
+            <a:r>
+              <a:rPr lang="en-US" dirty="0" err="1"/>
+              <a:t>get_current_task</a:t>
+            </a:r>
+            <a:endParaRPr lang="en-US" dirty="0"/>
+          </a:p>
+          <a:p>
+            <a:r>
+              <a:rPr lang="en-US" dirty="0"/>
+              <a:t>Per-</a:t>
+            </a:r>
+            <a:r>
+              <a:rPr lang="en-US" dirty="0" err="1"/>
+              <a:t>cpu</a:t>
+            </a:r>
+            <a:r>
+              <a:rPr lang="en-US" dirty="0"/>
+              <a:t> implementation</a:t>
+            </a:r>
+          </a:p>
+          <a:p>
+            <a:pPr lvl="1"/>
+            <a:r>
+              <a:rPr lang="en-US" dirty="0"/>
+              <a:t>Keep CPU-specific base address of the per-</a:t>
+            </a:r>
+            <a:r>
+              <a:rPr lang="en-US" dirty="0" err="1"/>
+              <a:t>cpu</a:t>
+            </a:r>
+            <a:r>
+              <a:rPr lang="en-US" dirty="0"/>
+              <a:t> region in GS segment register</a:t>
+            </a:r>
+          </a:p>
+          <a:p>
+            <a:pPr lvl="1"/>
+            <a:r>
+              <a:rPr lang="en-US" dirty="0"/>
+              <a:t>Access by using the symbol address w/ respect to the base address</a:t>
+            </a:r>
+          </a:p>
+          <a:p>
+            <a:pPr lvl="1"/>
+            <a:r>
+              <a:rPr lang="en-US" dirty="0"/>
+              <a:t>Implemented as inline </a:t>
+            </a:r>
+            <a:r>
+              <a:rPr lang="en-US" dirty="0" err="1"/>
+              <a:t>asm</a:t>
+            </a:r>
+            <a:endParaRPr lang="en-US" dirty="0"/>
+          </a:p>
+          <a:p>
+            <a:pPr lvl="1"/>
+            <a:endParaRPr lang="en-US" dirty="0"/>
+          </a:p>
+        </p:txBody>
+      </p:sp>
+      <p:sp>
+        <p:nvSpPr>
+          <p:cNvPr id="4" name="TextBox 3">
+            <a:extLst>
+              <a:ext uri="{FF2B5EF4-FFF2-40B4-BE49-F238E27FC236}">
+                <a16:creationId xmlns:a16="http://schemas.microsoft.com/office/drawing/2014/main" id="{A05B279C-8282-85EA-1F76-6CCE90DDE8C1}"/>
+              </a:ext>
+            </a:extLst>
+          </p:cNvPr>
+          <p:cNvSpPr txBox="1"/>
+          <p:nvPr/>
+        </p:nvSpPr>
+        <p:spPr>
+          <a:xfrm>
+            <a:off x="7298871" y="1836964"/>
+            <a:ext cx="4171950" cy="1169551"/>
+          </a:xfrm>
+          <a:prstGeom prst="rect">
+            <a:avLst/>
+          </a:prstGeom>
+          <a:noFill/>
+        </p:spPr>
+        <p:txBody>
+          <a:bodyPr wrap="square" rtlCol="0">
+            <a:spAutoFit/>
+          </a:bodyPr>
+          <a:lstStyle/>
+          <a:p>
+            <a:r>
+              <a:rPr lang="en-US" sz="1400" b="0" dirty="0">
+                <a:effectLst/>
+                <a:latin typeface="Menlo" panose="020B0609030804020204" pitchFamily="49" charset="0"/>
+              </a:rPr>
+              <a:t>u64 </a:t>
+            </a:r>
+            <a:r>
+              <a:rPr lang="en-US" sz="1400" b="0" dirty="0" err="1">
+                <a:effectLst/>
+                <a:latin typeface="Menlo" panose="020B0609030804020204" pitchFamily="49" charset="0"/>
+              </a:rPr>
+              <a:t>pfo_val</a:t>
+            </a:r>
+            <a:r>
+              <a:rPr lang="en-US" sz="1400" b="0" dirty="0">
+                <a:effectLst/>
+                <a:latin typeface="Menlo" panose="020B0609030804020204" pitchFamily="49" charset="0"/>
+              </a:rPr>
+              <a:t>__; \</a:t>
+            </a:r>
+          </a:p>
+          <a:p>
+            <a:r>
+              <a:rPr lang="en-US" sz="1400" b="1" dirty="0" err="1">
+                <a:effectLst/>
+                <a:latin typeface="Menlo" panose="020B0609030804020204" pitchFamily="49" charset="0"/>
+              </a:rPr>
+              <a:t>asm</a:t>
+            </a:r>
+            <a:r>
+              <a:rPr lang="en-US" sz="1400" b="0" dirty="0">
+                <a:effectLst/>
+                <a:latin typeface="Menlo" panose="020B0609030804020204" pitchFamily="49" charset="0"/>
+              </a:rPr>
+              <a:t>("</a:t>
+            </a:r>
+            <a:r>
+              <a:rPr lang="en-US" sz="1400" b="0" dirty="0" err="1">
+                <a:effectLst/>
+                <a:latin typeface="Menlo" panose="020B0609030804020204" pitchFamily="49" charset="0"/>
+              </a:rPr>
+              <a:t>movq</a:t>
+            </a:r>
+            <a:r>
+              <a:rPr lang="en-US" sz="1400" b="0" dirty="0">
+                <a:effectLst/>
+                <a:latin typeface="Menlo" panose="020B0609030804020204" pitchFamily="49" charset="0"/>
+              </a:rPr>
+              <a:t> %%</a:t>
+            </a:r>
+            <a:r>
+              <a:rPr lang="en-US" sz="1400" b="0" dirty="0" err="1">
+                <a:effectLst/>
+                <a:latin typeface="Menlo" panose="020B0609030804020204" pitchFamily="49" charset="0"/>
+              </a:rPr>
+              <a:t>gs</a:t>
+            </a:r>
+            <a:r>
+              <a:rPr lang="en-US" sz="1400" b="0" dirty="0">
+                <a:effectLst/>
+                <a:latin typeface="Menlo" panose="020B0609030804020204" pitchFamily="49" charset="0"/>
+              </a:rPr>
+              <a:t>:%P[var] %[</a:t>
+            </a:r>
+            <a:r>
+              <a:rPr lang="en-US" sz="1400" b="0" dirty="0" err="1">
+                <a:effectLst/>
+                <a:latin typeface="Menlo" panose="020B0609030804020204" pitchFamily="49" charset="0"/>
+              </a:rPr>
+              <a:t>val</a:t>
+            </a:r>
+            <a:r>
+              <a:rPr lang="en-US" sz="1400" b="0" dirty="0">
+                <a:effectLst/>
+                <a:latin typeface="Menlo" panose="020B0609030804020204" pitchFamily="49" charset="0"/>
+              </a:rPr>
+              <a:t>]") \</a:t>
+            </a:r>
+          </a:p>
+          <a:p>
+            <a:r>
+              <a:rPr lang="en-US" sz="1400" b="0" dirty="0">
+                <a:effectLst/>
+                <a:latin typeface="Menlo" panose="020B0609030804020204" pitchFamily="49" charset="0"/>
+              </a:rPr>
+              <a:t>: [</a:t>
+            </a:r>
+            <a:r>
+              <a:rPr lang="en-US" sz="1400" b="0" dirty="0" err="1">
+                <a:effectLst/>
+                <a:latin typeface="Menlo" panose="020B0609030804020204" pitchFamily="49" charset="0"/>
+              </a:rPr>
+              <a:t>val</a:t>
+            </a:r>
+            <a:r>
+              <a:rPr lang="en-US" sz="1400" b="0" dirty="0">
+                <a:effectLst/>
+                <a:latin typeface="Menlo" panose="020B0609030804020204" pitchFamily="49" charset="0"/>
+              </a:rPr>
+              <a:t>] "=r" (</a:t>
+            </a:r>
+            <a:r>
+              <a:rPr lang="en-US" sz="1400" b="0" dirty="0" err="1">
+                <a:effectLst/>
+                <a:latin typeface="Menlo" panose="020B0609030804020204" pitchFamily="49" charset="0"/>
+              </a:rPr>
+              <a:t>pfo_val</a:t>
+            </a:r>
+            <a:r>
+              <a:rPr lang="en-US" sz="1400" b="0" dirty="0">
+                <a:effectLst/>
+                <a:latin typeface="Menlo" panose="020B0609030804020204" pitchFamily="49" charset="0"/>
+              </a:rPr>
+              <a:t>__) \</a:t>
+            </a:r>
+          </a:p>
+          <a:p>
+            <a:r>
+              <a:rPr lang="en-US" sz="1400" b="0" dirty="0">
+                <a:effectLst/>
+                <a:latin typeface="Menlo" panose="020B0609030804020204" pitchFamily="49" charset="0"/>
+              </a:rPr>
+              <a:t>: [var] "p" (&amp;(</a:t>
+            </a:r>
+            <a:r>
+              <a:rPr lang="en-US" sz="1400" b="0" dirty="0" err="1">
+                <a:effectLst/>
+                <a:latin typeface="Menlo" panose="020B0609030804020204" pitchFamily="49" charset="0"/>
+              </a:rPr>
+              <a:t>current_task</a:t>
+            </a:r>
+            <a:r>
+              <a:rPr lang="en-US" sz="1400" b="0" dirty="0">
+                <a:effectLst/>
+                <a:latin typeface="Menlo" panose="020B0609030804020204" pitchFamily="49" charset="0"/>
+              </a:rPr>
+              <a:t>))); \</a:t>
+            </a:r>
+          </a:p>
+          <a:p>
+            <a:r>
+              <a:rPr lang="en-US" sz="1400" b="0" dirty="0">
+                <a:effectLst/>
+                <a:latin typeface="Menlo" panose="020B0609030804020204" pitchFamily="49" charset="0"/>
+              </a:rPr>
+              <a:t>(</a:t>
+            </a:r>
+            <a:r>
+              <a:rPr lang="en-US" sz="1400" b="1" dirty="0">
+                <a:effectLst/>
+                <a:latin typeface="Menlo" panose="020B0609030804020204" pitchFamily="49" charset="0"/>
+              </a:rPr>
+              <a:t>struct</a:t>
+            </a:r>
+            <a:r>
+              <a:rPr lang="en-US" sz="1400" b="0" dirty="0">
+                <a:effectLst/>
+                <a:latin typeface="Menlo" panose="020B0609030804020204" pitchFamily="49" charset="0"/>
+              </a:rPr>
+              <a:t> </a:t>
+            </a:r>
+            <a:r>
+              <a:rPr lang="en-US" sz="1400" b="0" dirty="0" err="1">
+                <a:effectLst/>
+                <a:latin typeface="Menlo" panose="020B0609030804020204" pitchFamily="49" charset="0"/>
+              </a:rPr>
+              <a:t>task_struct</a:t>
+            </a:r>
+            <a:r>
+              <a:rPr lang="en-US" sz="1400" b="0" dirty="0">
+                <a:effectLst/>
+                <a:latin typeface="Menlo" panose="020B0609030804020204" pitchFamily="49" charset="0"/>
+              </a:rPr>
+              <a:t> *)</a:t>
+            </a:r>
+            <a:r>
+              <a:rPr lang="en-US" sz="1400" b="0" dirty="0" err="1">
+                <a:effectLst/>
+                <a:latin typeface="Menlo" panose="020B0609030804020204" pitchFamily="49" charset="0"/>
+              </a:rPr>
+              <a:t>pfo_val</a:t>
+            </a:r>
+            <a:r>
+              <a:rPr lang="en-US" sz="1400" b="0" dirty="0">
+                <a:effectLst/>
+                <a:latin typeface="Menlo" panose="020B0609030804020204" pitchFamily="49" charset="0"/>
+              </a:rPr>
+              <a:t>__;</a:t>
+            </a:r>
+          </a:p>
+        </p:txBody>
+      </p:sp>
+    </p:spTree>
+    <p:extLst>
+      <p:ext uri="{BB962C8B-B14F-4D97-AF65-F5344CB8AC3E}">
+        <p14:creationId xmlns:p14="http://schemas.microsoft.com/office/powerpoint/2010/main" val="3402924240"/>
+      </p:ext>
+    </p:extLst>
+  </p:cSld>
+  <p:clrMapOvr>
+    <a:masterClrMapping/>
+  </p:clrMapOvr>
+</p:sld>
+</file>
+
+<file path=ppt/slides/slide21.xml><?xml version="1.0" encoding="utf-8"?>
+<p:sld xmlns:a="http://schemas.openxmlformats.org/drawingml/2006/main" xmlns:r="http://schemas.openxmlformats.org/officeDocument/2006/relationships" xmlns:p="http://schemas.openxmlformats.org/presentationml/2006/main">
+  <p:cSld>
+    <p:spTree>
+      <p:nvGrpSpPr>
+        <p:cNvPr id="1" name=""/>
+        <p:cNvGrpSpPr/>
+        <p:nvPr/>
+      </p:nvGrpSpPr>
+      <p:grpSpPr>
+        <a:xfrm>
+          <a:off x="0" y="0"/>
+          <a:ext cx="0" cy="0"/>
+          <a:chOff x="0" y="0"/>
+          <a:chExt cx="0" cy="0"/>
+        </a:xfrm>
+      </p:grpSpPr>
+      <p:sp>
+        <p:nvSpPr>
+          <p:cNvPr id="2" name="Title 1">
+            <a:extLst>
+              <a:ext uri="{FF2B5EF4-FFF2-40B4-BE49-F238E27FC236}">
+                <a16:creationId xmlns:a16="http://schemas.microsoft.com/office/drawing/2014/main" id="{425FB9EC-0FD0-C89A-1D90-F642D6452A7E}"/>
+              </a:ext>
+            </a:extLst>
+          </p:cNvPr>
+          <p:cNvSpPr>
+            <a:spLocks noGrp="1"/>
+          </p:cNvSpPr>
+          <p:nvPr>
+            <p:ph type="title"/>
+          </p:nvPr>
+        </p:nvSpPr>
+        <p:spPr/>
+        <p:txBody>
+          <a:bodyPr/>
+          <a:lstStyle/>
+          <a:p>
+            <a:r>
+              <a:rPr lang="en-US" dirty="0"/>
+              <a:t>Per-</a:t>
+            </a:r>
+            <a:r>
+              <a:rPr lang="en-US" dirty="0" err="1"/>
+              <a:t>cpu</a:t>
+            </a:r>
+            <a:r>
+              <a:rPr lang="en-US" dirty="0"/>
+              <a:t> access in Rust</a:t>
+            </a:r>
+          </a:p>
+        </p:txBody>
+      </p:sp>
+      <p:sp>
+        <p:nvSpPr>
+          <p:cNvPr id="3" name="Content Placeholder 2">
+            <a:extLst>
+              <a:ext uri="{FF2B5EF4-FFF2-40B4-BE49-F238E27FC236}">
+                <a16:creationId xmlns:a16="http://schemas.microsoft.com/office/drawing/2014/main" id="{69E3EB7A-06BE-F430-1A84-CAB7731C406F}"/>
+              </a:ext>
+            </a:extLst>
+          </p:cNvPr>
+          <p:cNvSpPr>
+            <a:spLocks noGrp="1"/>
+          </p:cNvSpPr>
+          <p:nvPr>
+            <p:ph idx="1"/>
+          </p:nvPr>
+        </p:nvSpPr>
+        <p:spPr>
+          <a:xfrm>
+            <a:off x="838200" y="1825625"/>
+            <a:ext cx="5257800" cy="4351338"/>
+          </a:xfrm>
+        </p:spPr>
+        <p:txBody>
+          <a:bodyPr/>
+          <a:lstStyle/>
+          <a:p>
+            <a:r>
+              <a:rPr lang="en-US" dirty="0"/>
+              <a:t>The kernel has already taken care of the base-address (in GS)</a:t>
+            </a:r>
+          </a:p>
+          <a:p>
+            <a:r>
+              <a:rPr lang="en-US" dirty="0"/>
+              <a:t>Only need to use symbol address to calculate the address of the copy for this CPU</a:t>
+            </a:r>
+          </a:p>
+          <a:p>
+            <a:r>
+              <a:rPr lang="en-US" dirty="0"/>
+              <a:t>Rust implementation: </a:t>
+            </a:r>
+          </a:p>
+          <a:p>
+            <a:pPr lvl="1"/>
+            <a:r>
+              <a:rPr lang="en-US" dirty="0"/>
+              <a:t>get the symbol address (using nm / </a:t>
+            </a:r>
+            <a:r>
+              <a:rPr lang="en-US" dirty="0" err="1"/>
+              <a:t>System.map</a:t>
+            </a:r>
+            <a:r>
+              <a:rPr lang="en-US" dirty="0"/>
+              <a:t>) </a:t>
+            </a:r>
+          </a:p>
+          <a:p>
+            <a:pPr lvl="1"/>
+            <a:r>
+              <a:rPr lang="en-US" dirty="0"/>
+              <a:t>use Rust inline </a:t>
+            </a:r>
+            <a:r>
+              <a:rPr lang="en-US" dirty="0" err="1"/>
+              <a:t>asm</a:t>
+            </a:r>
+            <a:r>
+              <a:rPr lang="en-US" dirty="0"/>
+              <a:t> to access the value</a:t>
+            </a:r>
+          </a:p>
+        </p:txBody>
+      </p:sp>
+      <p:sp>
+        <p:nvSpPr>
+          <p:cNvPr id="5" name="TextBox 4">
+            <a:extLst>
+              <a:ext uri="{FF2B5EF4-FFF2-40B4-BE49-F238E27FC236}">
+                <a16:creationId xmlns:a16="http://schemas.microsoft.com/office/drawing/2014/main" id="{477794C3-AF6D-4C6D-899F-2FBC502206EF}"/>
+              </a:ext>
+            </a:extLst>
+          </p:cNvPr>
+          <p:cNvSpPr txBox="1"/>
+          <p:nvPr/>
+        </p:nvSpPr>
+        <p:spPr>
+          <a:xfrm>
+            <a:off x="6300627" y="1874728"/>
+            <a:ext cx="5257800" cy="3108543"/>
+          </a:xfrm>
+          <a:prstGeom prst="rect">
+            <a:avLst/>
+          </a:prstGeom>
+          <a:noFill/>
+        </p:spPr>
+        <p:txBody>
+          <a:bodyPr wrap="square" rtlCol="0">
+            <a:spAutoFit/>
+          </a:bodyPr>
+          <a:lstStyle/>
+          <a:p>
+            <a:r>
+              <a:rPr lang="en-US" sz="1400" b="0" i="1" dirty="0">
+                <a:solidFill>
+                  <a:srgbClr val="676E95"/>
+                </a:solidFill>
+                <a:effectLst/>
+                <a:latin typeface="Menlo" panose="020B0609030804020204" pitchFamily="49" charset="0"/>
+              </a:rPr>
+              <a:t>/// Currently returns u64 until `</a:t>
+            </a:r>
+            <a:r>
+              <a:rPr lang="en-US" sz="1400" b="0" i="1" dirty="0" err="1">
+                <a:solidFill>
+                  <a:srgbClr val="676E95"/>
+                </a:solidFill>
+                <a:effectLst/>
+                <a:latin typeface="Menlo" panose="020B0609030804020204" pitchFamily="49" charset="0"/>
+              </a:rPr>
+              <a:t>task_struct</a:t>
+            </a:r>
+            <a:r>
+              <a:rPr lang="en-US" sz="1400" b="0" i="1" dirty="0">
+                <a:solidFill>
+                  <a:srgbClr val="676E95"/>
+                </a:solidFill>
+                <a:effectLst/>
+                <a:latin typeface="Menlo" panose="020B0609030804020204" pitchFamily="49" charset="0"/>
+              </a:rPr>
+              <a:t>` binding is generated</a:t>
+            </a:r>
+            <a:endParaRPr lang="en-US" sz="1400" b="0" dirty="0">
+              <a:solidFill>
+                <a:srgbClr val="A6ACCD"/>
+              </a:solidFill>
+              <a:effectLst/>
+              <a:latin typeface="Menlo" panose="020B0609030804020204" pitchFamily="49" charset="0"/>
+            </a:endParaRPr>
+          </a:p>
+          <a:p>
+            <a:r>
+              <a:rPr lang="en-US" sz="1400" b="0" dirty="0">
+                <a:solidFill>
+                  <a:srgbClr val="82AAFF"/>
+                </a:solidFill>
+                <a:effectLst/>
+                <a:latin typeface="Menlo" panose="020B0609030804020204" pitchFamily="49" charset="0"/>
+              </a:rPr>
+              <a:t>pub</a:t>
+            </a:r>
+            <a:r>
+              <a:rPr lang="en-US" sz="1400" b="0" dirty="0">
+                <a:solidFill>
+                  <a:srgbClr val="89DDFF"/>
+                </a:solidFill>
+                <a:effectLst/>
+                <a:latin typeface="Menlo" panose="020B0609030804020204" pitchFamily="49" charset="0"/>
+              </a:rPr>
+              <a:t>(</a:t>
+            </a:r>
+            <a:r>
+              <a:rPr lang="en-US" sz="1400" b="0" dirty="0">
+                <a:solidFill>
+                  <a:srgbClr val="A6ACCD"/>
+                </a:solidFill>
+                <a:effectLst/>
+                <a:latin typeface="Menlo" panose="020B0609030804020204" pitchFamily="49" charset="0"/>
+              </a:rPr>
+              <a:t>crate</a:t>
+            </a:r>
+            <a:r>
+              <a:rPr lang="en-US" sz="1400" b="0" dirty="0">
+                <a:solidFill>
+                  <a:srgbClr val="89DDFF"/>
+                </a:solidFill>
+                <a:effectLst/>
+                <a:latin typeface="Menlo" panose="020B0609030804020204" pitchFamily="49" charset="0"/>
+              </a:rPr>
+              <a:t>)</a:t>
+            </a:r>
+            <a:r>
+              <a:rPr lang="en-US" sz="1400" b="0" dirty="0">
+                <a:solidFill>
+                  <a:srgbClr val="A6ACCD"/>
+                </a:solidFill>
+                <a:effectLst/>
+                <a:latin typeface="Menlo" panose="020B0609030804020204" pitchFamily="49" charset="0"/>
+              </a:rPr>
+              <a:t> </a:t>
+            </a:r>
+            <a:r>
+              <a:rPr lang="en-US" sz="1400" b="0" dirty="0" err="1">
+                <a:solidFill>
+                  <a:srgbClr val="A6ACCD"/>
+                </a:solidFill>
+                <a:effectLst/>
+                <a:latin typeface="Menlo" panose="020B0609030804020204" pitchFamily="49" charset="0"/>
+              </a:rPr>
+              <a:t>fn</a:t>
+            </a:r>
+            <a:r>
+              <a:rPr lang="en-US" sz="1400" b="0" dirty="0">
+                <a:solidFill>
+                  <a:srgbClr val="A6ACCD"/>
+                </a:solidFill>
+                <a:effectLst/>
+                <a:latin typeface="Menlo" panose="020B0609030804020204" pitchFamily="49" charset="0"/>
+              </a:rPr>
+              <a:t> </a:t>
+            </a:r>
+            <a:r>
+              <a:rPr lang="en-US" sz="1400" b="0" dirty="0" err="1">
+                <a:solidFill>
+                  <a:srgbClr val="82AAFF"/>
+                </a:solidFill>
+                <a:effectLst/>
+                <a:latin typeface="Menlo" panose="020B0609030804020204" pitchFamily="49" charset="0"/>
+              </a:rPr>
+              <a:t>bpf_get_current_task</a:t>
+            </a:r>
+            <a:r>
+              <a:rPr lang="en-US" sz="1400" b="0" dirty="0">
+                <a:solidFill>
+                  <a:srgbClr val="89DDFF"/>
+                </a:solidFill>
+                <a:effectLst/>
+                <a:latin typeface="Menlo" panose="020B0609030804020204" pitchFamily="49" charset="0"/>
+              </a:rPr>
+              <a:t>()</a:t>
+            </a:r>
+            <a:r>
+              <a:rPr lang="en-US" sz="1400" b="0" dirty="0">
+                <a:solidFill>
+                  <a:srgbClr val="A6ACCD"/>
+                </a:solidFill>
+                <a:effectLst/>
+                <a:latin typeface="Menlo" panose="020B0609030804020204" pitchFamily="49" charset="0"/>
+              </a:rPr>
+              <a:t> </a:t>
+            </a:r>
+            <a:r>
+              <a:rPr lang="en-US" sz="1400" b="0" dirty="0">
+                <a:solidFill>
+                  <a:srgbClr val="C792EA"/>
+                </a:solidFill>
+                <a:effectLst/>
+                <a:latin typeface="Menlo" panose="020B0609030804020204" pitchFamily="49" charset="0"/>
+              </a:rPr>
+              <a:t>-&gt;</a:t>
+            </a:r>
+            <a:r>
+              <a:rPr lang="en-US" sz="1400" b="0" dirty="0">
+                <a:solidFill>
+                  <a:srgbClr val="A6ACCD"/>
+                </a:solidFill>
+                <a:effectLst/>
+                <a:latin typeface="Menlo" panose="020B0609030804020204" pitchFamily="49" charset="0"/>
+              </a:rPr>
+              <a:t> u64 </a:t>
+            </a:r>
+            <a:r>
+              <a:rPr lang="en-US" sz="1400" b="0" dirty="0">
+                <a:solidFill>
+                  <a:srgbClr val="89DDFF"/>
+                </a:solidFill>
+                <a:effectLst/>
+                <a:latin typeface="Menlo" panose="020B0609030804020204" pitchFamily="49" charset="0"/>
+              </a:rPr>
+              <a:t>{</a:t>
+            </a:r>
+            <a:endParaRPr lang="en-US" sz="1400" b="0" dirty="0">
+              <a:solidFill>
+                <a:srgbClr val="A6ACCD"/>
+              </a:solidFill>
+              <a:effectLst/>
+              <a:latin typeface="Menlo" panose="020B0609030804020204" pitchFamily="49" charset="0"/>
+            </a:endParaRPr>
+          </a:p>
+          <a:p>
+            <a:r>
+              <a:rPr lang="en-US" sz="1400" b="0" dirty="0">
+                <a:solidFill>
+                  <a:srgbClr val="A6ACCD"/>
+                </a:solidFill>
+                <a:effectLst/>
+                <a:latin typeface="Menlo" panose="020B0609030804020204" pitchFamily="49" charset="0"/>
+              </a:rPr>
+              <a:t>  unsafe </a:t>
+            </a:r>
+            <a:r>
+              <a:rPr lang="en-US" sz="1400" b="0" dirty="0">
+                <a:solidFill>
+                  <a:srgbClr val="89DDFF"/>
+                </a:solidFill>
+                <a:effectLst/>
+                <a:latin typeface="Menlo" panose="020B0609030804020204" pitchFamily="49" charset="0"/>
+              </a:rPr>
+              <a:t>{</a:t>
+            </a:r>
+            <a:endParaRPr lang="en-US" sz="1400" b="0" dirty="0">
+              <a:solidFill>
+                <a:srgbClr val="A6ACCD"/>
+              </a:solidFill>
+              <a:effectLst/>
+              <a:latin typeface="Menlo" panose="020B0609030804020204" pitchFamily="49" charset="0"/>
+            </a:endParaRPr>
+          </a:p>
+          <a:p>
+            <a:r>
+              <a:rPr lang="en-US" sz="1400" b="0" dirty="0">
+                <a:solidFill>
+                  <a:srgbClr val="A6ACCD"/>
+                </a:solidFill>
+                <a:effectLst/>
+                <a:latin typeface="Menlo" panose="020B0609030804020204" pitchFamily="49" charset="0"/>
+              </a:rPr>
+              <a:t>    let mut current: u64</a:t>
+            </a:r>
+            <a:r>
+              <a:rPr lang="en-US" sz="1400" b="0" dirty="0">
+                <a:solidFill>
+                  <a:srgbClr val="89DDFF"/>
+                </a:solidFill>
+                <a:effectLst/>
+                <a:latin typeface="Menlo" panose="020B0609030804020204" pitchFamily="49" charset="0"/>
+              </a:rPr>
+              <a:t>;</a:t>
+            </a:r>
+            <a:endParaRPr lang="en-US" sz="1400" b="0" dirty="0">
+              <a:solidFill>
+                <a:srgbClr val="A6ACCD"/>
+              </a:solidFill>
+              <a:effectLst/>
+              <a:latin typeface="Menlo" panose="020B0609030804020204" pitchFamily="49" charset="0"/>
+            </a:endParaRPr>
+          </a:p>
+          <a:p>
+            <a:r>
+              <a:rPr lang="en-US" sz="1400" b="0" dirty="0">
+                <a:solidFill>
+                  <a:srgbClr val="A6ACCD"/>
+                </a:solidFill>
+                <a:effectLst/>
+                <a:latin typeface="Menlo" panose="020B0609030804020204" pitchFamily="49" charset="0"/>
+              </a:rPr>
+              <a:t>    core::arch::</a:t>
+            </a:r>
+            <a:r>
+              <a:rPr lang="en-US" sz="1400" b="0" dirty="0" err="1">
+                <a:solidFill>
+                  <a:srgbClr val="C792EA"/>
+                </a:solidFill>
+                <a:effectLst/>
+                <a:latin typeface="Menlo" panose="020B0609030804020204" pitchFamily="49" charset="0"/>
+              </a:rPr>
+              <a:t>asm</a:t>
+            </a:r>
+            <a:r>
+              <a:rPr lang="en-US" sz="1400" b="0" dirty="0">
+                <a:solidFill>
+                  <a:srgbClr val="A6ACCD"/>
+                </a:solidFill>
+                <a:effectLst/>
+                <a:latin typeface="Menlo" panose="020B0609030804020204" pitchFamily="49" charset="0"/>
+              </a:rPr>
+              <a:t>!</a:t>
+            </a:r>
+            <a:r>
+              <a:rPr lang="en-US" sz="1400" b="0" dirty="0">
+                <a:solidFill>
+                  <a:srgbClr val="89DDFF"/>
+                </a:solidFill>
+                <a:effectLst/>
+                <a:latin typeface="Menlo" panose="020B0609030804020204" pitchFamily="49" charset="0"/>
+              </a:rPr>
+              <a:t>(</a:t>
+            </a:r>
+            <a:endParaRPr lang="en-US" sz="1400" b="0" dirty="0">
+              <a:solidFill>
+                <a:srgbClr val="A6ACCD"/>
+              </a:solidFill>
+              <a:effectLst/>
+              <a:latin typeface="Menlo" panose="020B0609030804020204" pitchFamily="49" charset="0"/>
+            </a:endParaRPr>
+          </a:p>
+          <a:p>
+            <a:r>
+              <a:rPr lang="en-US" sz="1400" b="0" dirty="0">
+                <a:solidFill>
+                  <a:srgbClr val="89DDFF"/>
+                </a:solidFill>
+                <a:effectLst/>
+                <a:latin typeface="Menlo" panose="020B0609030804020204" pitchFamily="49" charset="0"/>
+              </a:rPr>
+              <a:t>      "</a:t>
+            </a:r>
+            <a:r>
+              <a:rPr lang="en-US" sz="1400" b="0" dirty="0">
+                <a:solidFill>
+                  <a:srgbClr val="C3E88D"/>
+                </a:solidFill>
+                <a:effectLst/>
+                <a:latin typeface="Menlo" panose="020B0609030804020204" pitchFamily="49" charset="0"/>
+              </a:rPr>
+              <a:t>mov {}, </a:t>
+            </a:r>
+            <a:r>
+              <a:rPr lang="en-US" sz="1400" b="0" dirty="0" err="1">
+                <a:solidFill>
+                  <a:srgbClr val="C3E88D"/>
+                </a:solidFill>
+                <a:effectLst/>
+                <a:latin typeface="Menlo" panose="020B0609030804020204" pitchFamily="49" charset="0"/>
+              </a:rPr>
+              <a:t>gs</a:t>
+            </a:r>
+            <a:r>
+              <a:rPr lang="en-US" sz="1400" b="0" dirty="0">
+                <a:solidFill>
+                  <a:srgbClr val="C3E88D"/>
+                </a:solidFill>
+                <a:effectLst/>
+                <a:latin typeface="Menlo" panose="020B0609030804020204" pitchFamily="49" charset="0"/>
+              </a:rPr>
+              <a:t>:[</a:t>
+            </a:r>
+            <a:r>
+              <a:rPr lang="en-US" sz="1400" b="0" dirty="0" err="1">
+                <a:solidFill>
+                  <a:srgbClr val="C3E88D"/>
+                </a:solidFill>
+                <a:effectLst/>
+                <a:latin typeface="Menlo" panose="020B0609030804020204" pitchFamily="49" charset="0"/>
+              </a:rPr>
+              <a:t>rcx</a:t>
+            </a:r>
+            <a:r>
+              <a:rPr lang="en-US" sz="1400" b="0" dirty="0">
+                <a:solidFill>
+                  <a:srgbClr val="C3E88D"/>
+                </a:solidFill>
+                <a:effectLst/>
+                <a:latin typeface="Menlo" panose="020B0609030804020204" pitchFamily="49" charset="0"/>
+              </a:rPr>
+              <a:t>]</a:t>
+            </a:r>
+            <a:r>
+              <a:rPr lang="en-US" sz="1400" b="0" dirty="0">
+                <a:solidFill>
+                  <a:srgbClr val="89DDFF"/>
+                </a:solidFill>
+                <a:effectLst/>
+                <a:latin typeface="Menlo" panose="020B0609030804020204" pitchFamily="49" charset="0"/>
+              </a:rPr>
+              <a:t>",</a:t>
+            </a:r>
+            <a:endParaRPr lang="en-US" sz="1400" b="0" dirty="0">
+              <a:solidFill>
+                <a:srgbClr val="A6ACCD"/>
+              </a:solidFill>
+              <a:effectLst/>
+              <a:latin typeface="Menlo" panose="020B0609030804020204" pitchFamily="49" charset="0"/>
+            </a:endParaRPr>
+          </a:p>
+          <a:p>
+            <a:r>
+              <a:rPr lang="en-US" sz="1400" b="0" dirty="0">
+                <a:solidFill>
+                  <a:srgbClr val="82AAFF"/>
+                </a:solidFill>
+                <a:effectLst/>
+                <a:latin typeface="Menlo" panose="020B0609030804020204" pitchFamily="49" charset="0"/>
+              </a:rPr>
+              <a:t>      out</a:t>
+            </a:r>
+            <a:r>
+              <a:rPr lang="en-US" sz="1400" b="0" dirty="0">
+                <a:solidFill>
+                  <a:srgbClr val="89DDFF"/>
+                </a:solidFill>
+                <a:effectLst/>
+                <a:latin typeface="Menlo" panose="020B0609030804020204" pitchFamily="49" charset="0"/>
+              </a:rPr>
+              <a:t>(</a:t>
+            </a:r>
+            <a:r>
+              <a:rPr lang="en-US" sz="1400" b="0" dirty="0">
+                <a:solidFill>
+                  <a:srgbClr val="A6ACCD"/>
+                </a:solidFill>
+                <a:effectLst/>
+                <a:latin typeface="Menlo" panose="020B0609030804020204" pitchFamily="49" charset="0"/>
+              </a:rPr>
+              <a:t>reg</a:t>
+            </a:r>
+            <a:r>
+              <a:rPr lang="en-US" sz="1400" b="0" dirty="0">
+                <a:solidFill>
+                  <a:srgbClr val="89DDFF"/>
+                </a:solidFill>
+                <a:effectLst/>
+                <a:latin typeface="Menlo" panose="020B0609030804020204" pitchFamily="49" charset="0"/>
+              </a:rPr>
+              <a:t>)</a:t>
+            </a:r>
+            <a:r>
+              <a:rPr lang="en-US" sz="1400" b="0" dirty="0">
+                <a:solidFill>
+                  <a:srgbClr val="A6ACCD"/>
+                </a:solidFill>
+                <a:effectLst/>
+                <a:latin typeface="Menlo" panose="020B0609030804020204" pitchFamily="49" charset="0"/>
+              </a:rPr>
+              <a:t> current</a:t>
+            </a:r>
+            <a:r>
+              <a:rPr lang="en-US" sz="1400" b="0" dirty="0">
+                <a:solidFill>
+                  <a:srgbClr val="89DDFF"/>
+                </a:solidFill>
+                <a:effectLst/>
+                <a:latin typeface="Menlo" panose="020B0609030804020204" pitchFamily="49" charset="0"/>
+              </a:rPr>
+              <a:t>,</a:t>
+            </a:r>
+            <a:endParaRPr lang="en-US" sz="1400" b="0" dirty="0">
+              <a:solidFill>
+                <a:srgbClr val="A6ACCD"/>
+              </a:solidFill>
+              <a:effectLst/>
+              <a:latin typeface="Menlo" panose="020B0609030804020204" pitchFamily="49" charset="0"/>
+            </a:endParaRPr>
+          </a:p>
+          <a:p>
+            <a:r>
+              <a:rPr lang="en-US" sz="1400" b="0" dirty="0">
+                <a:solidFill>
+                  <a:srgbClr val="82AAFF"/>
+                </a:solidFill>
+                <a:effectLst/>
+                <a:latin typeface="Menlo" panose="020B0609030804020204" pitchFamily="49" charset="0"/>
+              </a:rPr>
+              <a:t>      in</a:t>
+            </a:r>
+            <a:r>
+              <a:rPr lang="en-US" sz="1400" b="0" dirty="0">
+                <a:solidFill>
+                  <a:srgbClr val="89DDFF"/>
+                </a:solidFill>
+                <a:effectLst/>
+                <a:latin typeface="Menlo" panose="020B0609030804020204" pitchFamily="49" charset="0"/>
+              </a:rPr>
+              <a:t>("</a:t>
+            </a:r>
+            <a:r>
+              <a:rPr lang="en-US" sz="1400" b="0" dirty="0" err="1">
+                <a:solidFill>
+                  <a:srgbClr val="C3E88D"/>
+                </a:solidFill>
+                <a:effectLst/>
+                <a:latin typeface="Menlo" panose="020B0609030804020204" pitchFamily="49" charset="0"/>
+              </a:rPr>
+              <a:t>rcx</a:t>
+            </a:r>
+            <a:r>
+              <a:rPr lang="en-US" sz="1400" b="0" dirty="0">
+                <a:solidFill>
+                  <a:srgbClr val="89DDFF"/>
+                </a:solidFill>
+                <a:effectLst/>
+                <a:latin typeface="Menlo" panose="020B0609030804020204" pitchFamily="49" charset="0"/>
+              </a:rPr>
+              <a:t>")</a:t>
+            </a:r>
+            <a:r>
+              <a:rPr lang="en-US" sz="1400" b="0" dirty="0">
+                <a:solidFill>
+                  <a:srgbClr val="A6ACCD"/>
+                </a:solidFill>
+                <a:effectLst/>
+                <a:latin typeface="Menlo" panose="020B0609030804020204" pitchFamily="49" charset="0"/>
+              </a:rPr>
+              <a:t> </a:t>
+            </a:r>
+            <a:r>
+              <a:rPr lang="en-US" sz="1400" b="0" dirty="0">
+                <a:solidFill>
+                  <a:srgbClr val="82AAFF"/>
+                </a:solidFill>
+                <a:effectLst/>
+                <a:latin typeface="Menlo" panose="020B0609030804020204" pitchFamily="49" charset="0"/>
+              </a:rPr>
+              <a:t>stub::</a:t>
+            </a:r>
+            <a:r>
+              <a:rPr lang="en-US" sz="1400" b="0" dirty="0" err="1">
+                <a:solidFill>
+                  <a:srgbClr val="82AAFF"/>
+                </a:solidFill>
+                <a:effectLst/>
+                <a:latin typeface="Menlo" panose="020B0609030804020204" pitchFamily="49" charset="0"/>
+              </a:rPr>
+              <a:t>current_task_addr</a:t>
+            </a:r>
+            <a:r>
+              <a:rPr lang="en-US" sz="1400" b="0" dirty="0">
+                <a:solidFill>
+                  <a:srgbClr val="89DDFF"/>
+                </a:solidFill>
+                <a:effectLst/>
+                <a:latin typeface="Menlo" panose="020B0609030804020204" pitchFamily="49" charset="0"/>
+              </a:rPr>
+              <a:t>(),</a:t>
+            </a:r>
+            <a:endParaRPr lang="en-US" sz="1400" b="0" dirty="0">
+              <a:solidFill>
+                <a:srgbClr val="A6ACCD"/>
+              </a:solidFill>
+              <a:effectLst/>
+              <a:latin typeface="Menlo" panose="020B0609030804020204" pitchFamily="49" charset="0"/>
+            </a:endParaRPr>
+          </a:p>
+          <a:p>
+            <a:r>
+              <a:rPr lang="en-US" sz="1400" b="0" dirty="0">
+                <a:solidFill>
+                  <a:srgbClr val="89DDFF"/>
+                </a:solidFill>
+                <a:effectLst/>
+                <a:latin typeface="Menlo" panose="020B0609030804020204" pitchFamily="49" charset="0"/>
+              </a:rPr>
+              <a:t>    );</a:t>
+            </a:r>
+            <a:endParaRPr lang="en-US" sz="1400" b="0" dirty="0">
+              <a:solidFill>
+                <a:srgbClr val="A6ACCD"/>
+              </a:solidFill>
+              <a:effectLst/>
+              <a:latin typeface="Menlo" panose="020B0609030804020204" pitchFamily="49" charset="0"/>
+            </a:endParaRPr>
+          </a:p>
+          <a:p>
+            <a:r>
+              <a:rPr lang="en-US" sz="1400" b="0" dirty="0">
+                <a:solidFill>
+                  <a:srgbClr val="A6ACCD"/>
+                </a:solidFill>
+                <a:effectLst/>
+                <a:latin typeface="Menlo" panose="020B0609030804020204" pitchFamily="49" charset="0"/>
+              </a:rPr>
+              <a:t>  current</a:t>
+            </a:r>
+          </a:p>
+          <a:p>
+            <a:r>
+              <a:rPr lang="en-US" sz="1400" b="0" dirty="0">
+                <a:solidFill>
+                  <a:srgbClr val="89DDFF"/>
+                </a:solidFill>
+                <a:effectLst/>
+                <a:latin typeface="Menlo" panose="020B0609030804020204" pitchFamily="49" charset="0"/>
+              </a:rPr>
+              <a:t>  }</a:t>
+            </a:r>
+            <a:endParaRPr lang="en-US" sz="1400" b="0" dirty="0">
+              <a:solidFill>
+                <a:srgbClr val="A6ACCD"/>
+              </a:solidFill>
+              <a:effectLst/>
+              <a:latin typeface="Menlo" panose="020B0609030804020204" pitchFamily="49" charset="0"/>
+            </a:endParaRPr>
+          </a:p>
+          <a:p>
+            <a:r>
+              <a:rPr lang="en-US" sz="1400" b="0" dirty="0">
+                <a:solidFill>
+                  <a:srgbClr val="89DDFF"/>
+                </a:solidFill>
+                <a:effectLst/>
+                <a:latin typeface="Menlo" panose="020B0609030804020204" pitchFamily="49" charset="0"/>
+              </a:rPr>
+              <a:t>}</a:t>
+            </a:r>
+            <a:endParaRPr lang="en-US" sz="1400" b="0" dirty="0">
+              <a:solidFill>
+                <a:srgbClr val="A6ACCD"/>
+              </a:solidFill>
+              <a:effectLst/>
+              <a:latin typeface="Menlo" panose="020B0609030804020204" pitchFamily="49" charset="0"/>
+            </a:endParaRPr>
+          </a:p>
+          <a:p>
+            <a:endParaRPr lang="en-US" sz="1400" dirty="0"/>
+          </a:p>
+        </p:txBody>
+      </p:sp>
+    </p:spTree>
+    <p:extLst>
+      <p:ext uri="{BB962C8B-B14F-4D97-AF65-F5344CB8AC3E}">
+        <p14:creationId xmlns:p14="http://schemas.microsoft.com/office/powerpoint/2010/main" val="1596081027"/>
+      </p:ext>
+    </p:extLst>
+  </p:cSld>
+  <p:clrMapOvr>
+    <a:masterClrMapping/>
+  </p:clrMapOvr>
+</p:sld>
+</file>
+
+<file path=ppt/slides/slide22.xml><?xml version="1.0" encoding="utf-8"?>
+<p:sld xmlns:a="http://schemas.openxmlformats.org/drawingml/2006/main" xmlns:r="http://schemas.openxmlformats.org/officeDocument/2006/relationships" xmlns:p="http://schemas.openxmlformats.org/presentationml/2006/main">
+  <p:cSld>
+    <p:spTree>
+      <p:nvGrpSpPr>
+        <p:cNvPr id="1" name=""/>
+        <p:cNvGrpSpPr/>
+        <p:nvPr/>
+      </p:nvGrpSpPr>
+      <p:grpSpPr>
+        <a:xfrm>
+          <a:off x="0" y="0"/>
+          <a:ext cx="0" cy="0"/>
+          <a:chOff x="0" y="0"/>
+          <a:chExt cx="0" cy="0"/>
+        </a:xfrm>
+      </p:grpSpPr>
+      <p:sp>
+        <p:nvSpPr>
+          <p:cNvPr id="2" name="Title 1">
+            <a:extLst>
+              <a:ext uri="{FF2B5EF4-FFF2-40B4-BE49-F238E27FC236}">
+                <a16:creationId xmlns:a16="http://schemas.microsoft.com/office/drawing/2014/main" id="{2B75B49C-8E5C-4471-F1EA-A7AC404DF83C}"/>
+              </a:ext>
+            </a:extLst>
+          </p:cNvPr>
+          <p:cNvSpPr>
+            <a:spLocks noGrp="1"/>
+          </p:cNvSpPr>
+          <p:nvPr>
+            <p:ph type="title"/>
+          </p:nvPr>
+        </p:nvSpPr>
+        <p:spPr/>
+        <p:txBody>
+          <a:bodyPr/>
+          <a:lstStyle/>
+          <a:p>
+            <a:r>
+              <a:rPr lang="en-US" dirty="0"/>
+              <a:t>Task Storage access</a:t>
+            </a:r>
+          </a:p>
+        </p:txBody>
+      </p:sp>
+      <p:sp>
+        <p:nvSpPr>
+          <p:cNvPr id="3" name="Content Placeholder 2">
+            <a:extLst>
+              <a:ext uri="{FF2B5EF4-FFF2-40B4-BE49-F238E27FC236}">
+                <a16:creationId xmlns:a16="http://schemas.microsoft.com/office/drawing/2014/main" id="{C77B7C90-72BA-6E52-09C4-600DE1F91D85}"/>
+              </a:ext>
+            </a:extLst>
+          </p:cNvPr>
+          <p:cNvSpPr>
+            <a:spLocks noGrp="1"/>
+          </p:cNvSpPr>
+          <p:nvPr>
+            <p:ph idx="1"/>
+          </p:nvPr>
+        </p:nvSpPr>
+        <p:spPr/>
+        <p:txBody>
+          <a:bodyPr/>
+          <a:lstStyle/>
+          <a:p>
+            <a:r>
+              <a:rPr lang="en-US" dirty="0"/>
+              <a:t>Generate </a:t>
+            </a:r>
+            <a:r>
+              <a:rPr lang="en-US" dirty="0" err="1"/>
+              <a:t>task_storage</a:t>
+            </a:r>
+            <a:r>
+              <a:rPr lang="en-US" dirty="0"/>
+              <a:t> binding using </a:t>
+            </a:r>
+            <a:r>
+              <a:rPr lang="en-US" dirty="0" err="1"/>
+              <a:t>bindgen</a:t>
+            </a:r>
+            <a:endParaRPr lang="en-US" dirty="0"/>
+          </a:p>
+          <a:p>
+            <a:r>
+              <a:rPr lang="en-US" dirty="0"/>
+              <a:t>Export a wrapper struct to the user programs</a:t>
+            </a:r>
+          </a:p>
+          <a:p>
+            <a:pPr lvl="1"/>
+            <a:r>
+              <a:rPr lang="en-US" dirty="0"/>
+              <a:t>all field by default private</a:t>
+            </a:r>
+          </a:p>
+          <a:p>
+            <a:pPr lvl="1"/>
+            <a:r>
+              <a:rPr lang="en-US" dirty="0"/>
+              <a:t>using public field accessors, e.g., </a:t>
+            </a:r>
+            <a:r>
+              <a:rPr lang="en-US" dirty="0" err="1"/>
+              <a:t>get_current_pid</a:t>
+            </a:r>
+            <a:endParaRPr lang="en-US" dirty="0"/>
+          </a:p>
+          <a:p>
+            <a:pPr lvl="1"/>
+            <a:r>
+              <a:rPr lang="en-US" dirty="0"/>
+              <a:t>field accessors can replace certain helpers</a:t>
+            </a:r>
+          </a:p>
+          <a:p>
+            <a:r>
+              <a:rPr lang="en-US" dirty="0"/>
+              <a:t>Question: Is it safe to directly expose a read-only pointer/reference to user programs</a:t>
+            </a:r>
+          </a:p>
+        </p:txBody>
+      </p:sp>
+    </p:spTree>
+    <p:extLst>
+      <p:ext uri="{BB962C8B-B14F-4D97-AF65-F5344CB8AC3E}">
+        <p14:creationId xmlns:p14="http://schemas.microsoft.com/office/powerpoint/2010/main" val="675158330"/>
+      </p:ext>
+    </p:extLst>
+  </p:cSld>
+  <p:clrMapOvr>
+    <a:masterClrMapping/>
+  </p:clrMapOvr>
+</p:sld>
+</file>
+
+<file path=ppt/slides/slide23.xml><?xml version="1.0" encoding="utf-8"?>
+<p:sld xmlns:a="http://schemas.openxmlformats.org/drawingml/2006/main" xmlns:r="http://schemas.openxmlformats.org/officeDocument/2006/relationships" xmlns:p="http://schemas.openxmlformats.org/presentationml/2006/main">
+  <p:cSld>
+    <p:spTree>
+      <p:nvGrpSpPr>
+        <p:cNvPr id="1" name=""/>
+        <p:cNvGrpSpPr/>
+        <p:nvPr/>
+      </p:nvGrpSpPr>
+      <p:grpSpPr>
+        <a:xfrm>
+          <a:off x="0" y="0"/>
+          <a:ext cx="0" cy="0"/>
+          <a:chOff x="0" y="0"/>
+          <a:chExt cx="0" cy="0"/>
+        </a:xfrm>
+      </p:grpSpPr>
+      <p:sp>
+        <p:nvSpPr>
+          <p:cNvPr id="2" name="Title 1">
+            <a:extLst>
+              <a:ext uri="{FF2B5EF4-FFF2-40B4-BE49-F238E27FC236}">
+                <a16:creationId xmlns:a16="http://schemas.microsoft.com/office/drawing/2014/main" id="{FBBA1676-DE42-241C-E7E0-A57C6300BDCD}"/>
+              </a:ext>
+            </a:extLst>
+          </p:cNvPr>
+          <p:cNvSpPr>
+            <a:spLocks noGrp="1"/>
+          </p:cNvSpPr>
+          <p:nvPr>
+            <p:ph type="ctrTitle"/>
+          </p:nvPr>
+        </p:nvSpPr>
+        <p:spPr/>
+        <p:txBody>
+          <a:bodyPr/>
+          <a:lstStyle/>
+          <a:p>
+            <a:r>
+              <a:rPr lang="en-US" dirty="0"/>
+              <a:t>Progress 20230406</a:t>
+            </a:r>
+          </a:p>
+        </p:txBody>
+      </p:sp>
+      <p:sp>
+        <p:nvSpPr>
+          <p:cNvPr id="3" name="Subtitle 2">
+            <a:extLst>
+              <a:ext uri="{FF2B5EF4-FFF2-40B4-BE49-F238E27FC236}">
+                <a16:creationId xmlns:a16="http://schemas.microsoft.com/office/drawing/2014/main" id="{CCD6770C-019D-4FBB-FDD6-3C357BD439AB}"/>
+              </a:ext>
+            </a:extLst>
+          </p:cNvPr>
+          <p:cNvSpPr>
+            <a:spLocks noGrp="1"/>
+          </p:cNvSpPr>
+          <p:nvPr>
+            <p:ph type="subTitle" idx="1"/>
+          </p:nvPr>
+        </p:nvSpPr>
+        <p:spPr/>
+        <p:txBody>
+          <a:bodyPr/>
+          <a:lstStyle/>
+          <a:p>
+            <a:endParaRPr lang="en-US"/>
+          </a:p>
+        </p:txBody>
+      </p:sp>
+    </p:spTree>
+    <p:extLst>
+      <p:ext uri="{BB962C8B-B14F-4D97-AF65-F5344CB8AC3E}">
+        <p14:creationId xmlns:p14="http://schemas.microsoft.com/office/powerpoint/2010/main" val="1654659315"/>
+      </p:ext>
+    </p:extLst>
+  </p:cSld>
+  <p:clrMapOvr>
+    <a:masterClrMapping/>
+  </p:clrMapOvr>
+</p:sld>
+</file>
+
+<file path=ppt/slides/slide24.xml><?xml version="1.0" encoding="utf-8"?>
+<p:sld xmlns:a="http://schemas.openxmlformats.org/drawingml/2006/main" xmlns:r="http://schemas.openxmlformats.org/officeDocument/2006/relationships" xmlns:p="http://schemas.openxmlformats.org/presentationml/2006/main">
+  <p:cSld>
+    <p:spTree>
+      <p:nvGrpSpPr>
+        <p:cNvPr id="1" name=""/>
+        <p:cNvGrpSpPr/>
+        <p:nvPr/>
+      </p:nvGrpSpPr>
+      <p:grpSpPr>
+        <a:xfrm>
+          <a:off x="0" y="0"/>
+          <a:ext cx="0" cy="0"/>
+          <a:chOff x="0" y="0"/>
+          <a:chExt cx="0" cy="0"/>
+        </a:xfrm>
+      </p:grpSpPr>
+      <p:sp>
+        <p:nvSpPr>
+          <p:cNvPr id="2" name="Title 1">
+            <a:extLst>
+              <a:ext uri="{FF2B5EF4-FFF2-40B4-BE49-F238E27FC236}">
+                <a16:creationId xmlns:a16="http://schemas.microsoft.com/office/drawing/2014/main" id="{ABF8134E-8E9C-5AD1-9D88-2EDDAD46CEE5}"/>
+              </a:ext>
+            </a:extLst>
+          </p:cNvPr>
+          <p:cNvSpPr>
+            <a:spLocks noGrp="1"/>
+          </p:cNvSpPr>
+          <p:nvPr>
+            <p:ph type="title"/>
+          </p:nvPr>
+        </p:nvSpPr>
+        <p:spPr/>
+        <p:txBody>
+          <a:bodyPr/>
+          <a:lstStyle/>
+          <a:p>
+            <a:r>
+              <a:rPr lang="en-US" dirty="0"/>
+              <a:t>Progress</a:t>
+            </a:r>
+          </a:p>
+        </p:txBody>
+      </p:sp>
+      <p:sp>
+        <p:nvSpPr>
+          <p:cNvPr id="3" name="Content Placeholder 2">
+            <a:extLst>
+              <a:ext uri="{FF2B5EF4-FFF2-40B4-BE49-F238E27FC236}">
+                <a16:creationId xmlns:a16="http://schemas.microsoft.com/office/drawing/2014/main" id="{8F3697A7-7007-A15B-C24F-9C1F72191EA4}"/>
+              </a:ext>
+            </a:extLst>
+          </p:cNvPr>
+          <p:cNvSpPr>
+            <a:spLocks noGrp="1"/>
+          </p:cNvSpPr>
+          <p:nvPr>
+            <p:ph idx="1"/>
+          </p:nvPr>
+        </p:nvSpPr>
+        <p:spPr/>
+        <p:txBody>
+          <a:bodyPr/>
+          <a:lstStyle/>
+          <a:p>
+            <a:r>
+              <a:rPr lang="en-US" dirty="0"/>
+              <a:t>Fixed OOB access bug in </a:t>
+            </a:r>
+            <a:r>
+              <a:rPr lang="en-US" sz="2600" dirty="0" err="1">
+                <a:latin typeface="Consolas" panose="020B0609020204030204" pitchFamily="49" charset="0"/>
+                <a:cs typeface="Consolas" panose="020B0609020204030204" pitchFamily="49" charset="0"/>
+              </a:rPr>
+              <a:t>get_current_comm</a:t>
+            </a:r>
+            <a:r>
+              <a:rPr lang="en-US" sz="2600" dirty="0">
+                <a:latin typeface="Consolas" panose="020B0609020204030204" pitchFamily="49" charset="0"/>
+                <a:cs typeface="Consolas" panose="020B0609020204030204" pitchFamily="49" charset="0"/>
+              </a:rPr>
+              <a:t>()</a:t>
+            </a:r>
+          </a:p>
+          <a:p>
+            <a:pPr lvl="1"/>
+            <a:r>
+              <a:rPr lang="en-US" dirty="0"/>
+              <a:t>brings up exception handling problem</a:t>
+            </a:r>
+          </a:p>
+          <a:p>
+            <a:pPr lvl="1"/>
+            <a:r>
+              <a:rPr lang="en-US" dirty="0"/>
+              <a:t>needed for RAII (and safety in general)</a:t>
+            </a:r>
+          </a:p>
+          <a:p>
+            <a:r>
+              <a:rPr lang="en-US" dirty="0"/>
+              <a:t>Learning about general EH ABI</a:t>
+            </a:r>
+          </a:p>
+          <a:p>
+            <a:pPr lvl="1"/>
+            <a:r>
+              <a:rPr lang="en-US" dirty="0"/>
+              <a:t>Itanium ABI for C++ and Rust</a:t>
+            </a:r>
+          </a:p>
+          <a:p>
+            <a:r>
+              <a:rPr lang="en-US" dirty="0"/>
+              <a:t>Checking unwinding implementation of Theseus</a:t>
+            </a:r>
+          </a:p>
+          <a:p>
+            <a:endParaRPr lang="en-US" dirty="0"/>
+          </a:p>
+        </p:txBody>
+      </p:sp>
+    </p:spTree>
+    <p:extLst>
+      <p:ext uri="{BB962C8B-B14F-4D97-AF65-F5344CB8AC3E}">
+        <p14:creationId xmlns:p14="http://schemas.microsoft.com/office/powerpoint/2010/main" val="3857028673"/>
+      </p:ext>
+    </p:extLst>
+  </p:cSld>
+  <p:clrMapOvr>
+    <a:masterClrMapping/>
+  </p:clrMapOvr>
+</p:sld>
+</file>
+
+<file path=ppt/slides/slide25.xml><?xml version="1.0" encoding="utf-8"?>
+<p:sld xmlns:a="http://schemas.openxmlformats.org/drawingml/2006/main" xmlns:r="http://schemas.openxmlformats.org/officeDocument/2006/relationships" xmlns:p="http://schemas.openxmlformats.org/presentationml/2006/main">
+  <p:cSld>
+    <p:spTree>
+      <p:nvGrpSpPr>
+        <p:cNvPr id="1" name=""/>
+        <p:cNvGrpSpPr/>
+        <p:nvPr/>
+      </p:nvGrpSpPr>
+      <p:grpSpPr>
+        <a:xfrm>
+          <a:off x="0" y="0"/>
+          <a:ext cx="0" cy="0"/>
+          <a:chOff x="0" y="0"/>
+          <a:chExt cx="0" cy="0"/>
+        </a:xfrm>
+      </p:grpSpPr>
+      <p:sp>
+        <p:nvSpPr>
+          <p:cNvPr id="2" name="Title 1">
+            <a:extLst>
+              <a:ext uri="{FF2B5EF4-FFF2-40B4-BE49-F238E27FC236}">
+                <a16:creationId xmlns:a16="http://schemas.microsoft.com/office/drawing/2014/main" id="{95A27908-E5C5-BC1C-745C-BA2749B7E119}"/>
+              </a:ext>
+            </a:extLst>
+          </p:cNvPr>
+          <p:cNvSpPr>
+            <a:spLocks noGrp="1"/>
+          </p:cNvSpPr>
+          <p:nvPr>
+            <p:ph type="title"/>
+          </p:nvPr>
+        </p:nvSpPr>
+        <p:spPr/>
+        <p:txBody>
+          <a:bodyPr/>
+          <a:lstStyle/>
+          <a:p>
+            <a:r>
+              <a:rPr lang="en-US" dirty="0" err="1"/>
+              <a:t>get_current_comm</a:t>
+            </a:r>
+            <a:r>
+              <a:rPr lang="en-US" dirty="0"/>
+              <a:t>() bug</a:t>
+            </a:r>
+          </a:p>
+        </p:txBody>
+      </p:sp>
+      <p:sp>
+        <p:nvSpPr>
+          <p:cNvPr id="3" name="Content Placeholder 2">
+            <a:extLst>
+              <a:ext uri="{FF2B5EF4-FFF2-40B4-BE49-F238E27FC236}">
+                <a16:creationId xmlns:a16="http://schemas.microsoft.com/office/drawing/2014/main" id="{B3C13D16-C0FF-A4E9-45C3-B007FF299A6A}"/>
+              </a:ext>
+            </a:extLst>
+          </p:cNvPr>
+          <p:cNvSpPr>
+            <a:spLocks noGrp="1"/>
+          </p:cNvSpPr>
+          <p:nvPr>
+            <p:ph idx="1"/>
+          </p:nvPr>
+        </p:nvSpPr>
+        <p:spPr/>
+        <p:txBody>
+          <a:bodyPr/>
+          <a:lstStyle/>
+          <a:p>
+            <a:r>
+              <a:rPr lang="en-US" dirty="0"/>
+              <a:t>The </a:t>
+            </a:r>
+            <a:r>
+              <a:rPr lang="en-US" sz="2600" dirty="0" err="1">
+                <a:latin typeface="Consolas" panose="020B0609020204030204" pitchFamily="49" charset="0"/>
+                <a:cs typeface="Consolas" panose="020B0609020204030204" pitchFamily="49" charset="0"/>
+              </a:rPr>
+              <a:t>get_current_comm</a:t>
+            </a:r>
+            <a:r>
+              <a:rPr lang="en-US" sz="2600" dirty="0">
+                <a:latin typeface="Consolas" panose="020B0609020204030204" pitchFamily="49" charset="0"/>
+                <a:cs typeface="Consolas" panose="020B0609020204030204" pitchFamily="49" charset="0"/>
+              </a:rPr>
+              <a:t>()</a:t>
+            </a:r>
+            <a:r>
+              <a:rPr lang="en-US" dirty="0"/>
+              <a:t> helper copies the task comm (name) into a user supplied buffer</a:t>
+            </a:r>
+          </a:p>
+          <a:p>
+            <a:r>
+              <a:rPr lang="en-US" dirty="0"/>
+              <a:t>An index miscalculation causes OOB access of the buffer</a:t>
+            </a:r>
+          </a:p>
+          <a:p>
+            <a:pPr lvl="1"/>
+            <a:r>
+              <a:rPr lang="en-US" dirty="0"/>
+              <a:t>Result: </a:t>
+            </a:r>
+            <a:r>
+              <a:rPr lang="en-US" sz="2200" dirty="0" err="1">
+                <a:latin typeface="Consolas" panose="020B0609020204030204" pitchFamily="49" charset="0"/>
+                <a:cs typeface="Consolas" panose="020B0609020204030204" pitchFamily="49" charset="0"/>
+              </a:rPr>
+              <a:t>trace_event</a:t>
+            </a:r>
+            <a:r>
+              <a:rPr lang="en-US" dirty="0"/>
+              <a:t> sample hangs</a:t>
+            </a:r>
+          </a:p>
+          <a:p>
+            <a:r>
+              <a:rPr lang="en-US" dirty="0"/>
+              <a:t>Rust compiler generates runtime bounds checks for array and slice accesses</a:t>
+            </a:r>
+          </a:p>
+          <a:p>
+            <a:pPr lvl="1"/>
+            <a:r>
+              <a:rPr lang="en-US" dirty="0"/>
+              <a:t>OOB triggers a Rust panic (not kernel panic)</a:t>
+            </a:r>
+          </a:p>
+          <a:p>
+            <a:pPr lvl="1"/>
+            <a:r>
+              <a:rPr lang="en-US" dirty="0"/>
+              <a:t>control-flow is transferred to the panic handler</a:t>
+            </a:r>
+          </a:p>
+          <a:p>
+            <a:pPr lvl="1"/>
+            <a:r>
+              <a:rPr lang="en-US" dirty="0"/>
+              <a:t>Our current panic handler is simply an infinite loop </a:t>
+            </a:r>
+            <a:r>
+              <a:rPr lang="en-US" dirty="0">
+                <a:sym typeface="Wingdings" pitchFamily="2" charset="2"/>
+              </a:rPr>
+              <a:t>:(</a:t>
+            </a:r>
+          </a:p>
+          <a:p>
+            <a:pPr lvl="1"/>
+            <a:r>
+              <a:rPr lang="en-US" dirty="0">
+                <a:sym typeface="Wingdings" pitchFamily="2" charset="2"/>
+              </a:rPr>
+              <a:t>Moreover, we set </a:t>
+            </a:r>
+            <a:r>
+              <a:rPr lang="en-US" b="1" dirty="0">
+                <a:sym typeface="Wingdings" pitchFamily="2" charset="2"/>
+              </a:rPr>
+              <a:t>abort</a:t>
+            </a:r>
+            <a:r>
+              <a:rPr lang="en-US" dirty="0">
+                <a:sym typeface="Wingdings" pitchFamily="2" charset="2"/>
+              </a:rPr>
+              <a:t> rather than </a:t>
+            </a:r>
+            <a:r>
+              <a:rPr lang="en-US" b="1" dirty="0">
+                <a:sym typeface="Wingdings" pitchFamily="2" charset="2"/>
+              </a:rPr>
+              <a:t>unwind</a:t>
+            </a:r>
+            <a:r>
+              <a:rPr lang="en-US" dirty="0">
+                <a:sym typeface="Wingdings" pitchFamily="2" charset="2"/>
+              </a:rPr>
+              <a:t> upon panic in build config</a:t>
+            </a:r>
+            <a:endParaRPr lang="en-US" dirty="0"/>
+          </a:p>
+          <a:p>
+            <a:pPr lvl="1"/>
+            <a:endParaRPr lang="en-US" dirty="0"/>
+          </a:p>
+        </p:txBody>
+      </p:sp>
+    </p:spTree>
+    <p:extLst>
+      <p:ext uri="{BB962C8B-B14F-4D97-AF65-F5344CB8AC3E}">
+        <p14:creationId xmlns:p14="http://schemas.microsoft.com/office/powerpoint/2010/main" val="2566534937"/>
+      </p:ext>
+    </p:extLst>
+  </p:cSld>
+  <p:clrMapOvr>
+    <a:masterClrMapping/>
+  </p:clrMapOvr>
+</p:sld>
+</file>
+
+<file path=ppt/slides/slide26.xml><?xml version="1.0" encoding="utf-8"?>
+<p:sld xmlns:a="http://schemas.openxmlformats.org/drawingml/2006/main" xmlns:r="http://schemas.openxmlformats.org/officeDocument/2006/relationships" xmlns:p="http://schemas.openxmlformats.org/presentationml/2006/main">
+  <p:cSld>
+    <p:spTree>
+      <p:nvGrpSpPr>
+        <p:cNvPr id="1" name=""/>
+        <p:cNvGrpSpPr/>
+        <p:nvPr/>
+      </p:nvGrpSpPr>
+      <p:grpSpPr>
+        <a:xfrm>
+          <a:off x="0" y="0"/>
+          <a:ext cx="0" cy="0"/>
+          <a:chOff x="0" y="0"/>
+          <a:chExt cx="0" cy="0"/>
+        </a:xfrm>
+      </p:grpSpPr>
+      <p:sp>
+        <p:nvSpPr>
+          <p:cNvPr id="2" name="Title 1">
+            <a:extLst>
+              <a:ext uri="{FF2B5EF4-FFF2-40B4-BE49-F238E27FC236}">
+                <a16:creationId xmlns:a16="http://schemas.microsoft.com/office/drawing/2014/main" id="{3E19C90B-BFCF-B3E3-7AC4-BD3711C23DB3}"/>
+              </a:ext>
+            </a:extLst>
+          </p:cNvPr>
+          <p:cNvSpPr>
+            <a:spLocks noGrp="1"/>
+          </p:cNvSpPr>
+          <p:nvPr>
+            <p:ph type="title"/>
+          </p:nvPr>
+        </p:nvSpPr>
+        <p:spPr/>
+        <p:txBody>
+          <a:bodyPr/>
+          <a:lstStyle/>
+          <a:p>
+            <a:r>
+              <a:rPr lang="en-US" dirty="0"/>
+              <a:t>EH and unwinding in Rust and C++</a:t>
+            </a:r>
+          </a:p>
+        </p:txBody>
+      </p:sp>
+      <p:sp>
+        <p:nvSpPr>
+          <p:cNvPr id="3" name="Content Placeholder 2">
+            <a:extLst>
+              <a:ext uri="{FF2B5EF4-FFF2-40B4-BE49-F238E27FC236}">
+                <a16:creationId xmlns:a16="http://schemas.microsoft.com/office/drawing/2014/main" id="{66F7F554-68FA-7177-FE1B-8971AEA31A6A}"/>
+              </a:ext>
+            </a:extLst>
+          </p:cNvPr>
+          <p:cNvSpPr>
+            <a:spLocks noGrp="1"/>
+          </p:cNvSpPr>
+          <p:nvPr>
+            <p:ph idx="1"/>
+          </p:nvPr>
+        </p:nvSpPr>
+        <p:spPr/>
+        <p:txBody>
+          <a:bodyPr/>
+          <a:lstStyle/>
+          <a:p>
+            <a:pPr marL="0" indent="0">
+              <a:buNone/>
+            </a:pPr>
+            <a:r>
+              <a:rPr lang="en-US" dirty="0"/>
+              <a:t>By default, Rust (and C++) unwinds the stack upon exception</a:t>
+            </a:r>
+          </a:p>
+          <a:p>
+            <a:pPr lvl="1"/>
+            <a:r>
+              <a:rPr lang="en-US" dirty="0"/>
+              <a:t>Essential component for RAII under exceptional circumstance</a:t>
+            </a:r>
+          </a:p>
+          <a:p>
+            <a:pPr lvl="1"/>
+            <a:r>
+              <a:rPr lang="en-US" dirty="0"/>
+              <a:t>unwind library walks over call stack and look for compiler-generated cleanup/EH code, a.k.a. the landing pad</a:t>
+            </a:r>
+          </a:p>
+          <a:p>
+            <a:pPr lvl="1"/>
+            <a:r>
+              <a:rPr lang="en-US" dirty="0"/>
+              <a:t>control is then transferred to the landing pad to perform cleanup/EH actions</a:t>
+            </a:r>
+          </a:p>
+          <a:p>
+            <a:pPr lvl="2"/>
+            <a:r>
+              <a:rPr lang="en-US" dirty="0"/>
+              <a:t>if exception is handled, the control flow is handed back to normal code</a:t>
+            </a:r>
+          </a:p>
+          <a:p>
+            <a:pPr lvl="2"/>
+            <a:r>
+              <a:rPr lang="en-US" dirty="0"/>
+              <a:t>otherwise, necessary cleanups (if any) are performed and unwind resumes for the next stack frame</a:t>
+            </a:r>
+          </a:p>
+          <a:p>
+            <a:pPr lvl="1"/>
+            <a:r>
+              <a:rPr lang="en-US" dirty="0"/>
+              <a:t>Rust uses </a:t>
+            </a:r>
+            <a:r>
+              <a:rPr lang="en-US" dirty="0" err="1"/>
+              <a:t>gcc’s</a:t>
+            </a:r>
+            <a:r>
+              <a:rPr lang="en-US" dirty="0"/>
+              <a:t> unwind library by default (because it uses </a:t>
+            </a:r>
+            <a:r>
+              <a:rPr lang="en-US" dirty="0" err="1"/>
+              <a:t>gcc</a:t>
+            </a:r>
+            <a:r>
+              <a:rPr lang="en-US" dirty="0"/>
+              <a:t> as the linker)</a:t>
+            </a:r>
+          </a:p>
+          <a:p>
+            <a:pPr lvl="2"/>
+            <a:r>
+              <a:rPr lang="en-US" dirty="0" err="1"/>
+              <a:t>userspace</a:t>
+            </a:r>
+            <a:r>
+              <a:rPr lang="en-US" dirty="0"/>
+              <a:t> library</a:t>
+            </a:r>
+          </a:p>
+          <a:p>
+            <a:pPr lvl="2"/>
+            <a:r>
+              <a:rPr lang="en-US" dirty="0"/>
+              <a:t>dynamic allocation of exception context</a:t>
+            </a:r>
+          </a:p>
+        </p:txBody>
+      </p:sp>
+    </p:spTree>
+    <p:extLst>
+      <p:ext uri="{BB962C8B-B14F-4D97-AF65-F5344CB8AC3E}">
+        <p14:creationId xmlns:p14="http://schemas.microsoft.com/office/powerpoint/2010/main" val="2695042566"/>
+      </p:ext>
+    </p:extLst>
+  </p:cSld>
+  <p:clrMapOvr>
+    <a:masterClrMapping/>
+  </p:clrMapOvr>
+</p:sld>
+</file>
+
+<file path=ppt/slides/slide27.xml><?xml version="1.0" encoding="utf-8"?>
+<p:sld xmlns:a="http://schemas.openxmlformats.org/drawingml/2006/main" xmlns:r="http://schemas.openxmlformats.org/officeDocument/2006/relationships" xmlns:p="http://schemas.openxmlformats.org/presentationml/2006/main">
+  <p:cSld>
+    <p:spTree>
+      <p:nvGrpSpPr>
+        <p:cNvPr id="1" name=""/>
+        <p:cNvGrpSpPr/>
+        <p:nvPr/>
+      </p:nvGrpSpPr>
+      <p:grpSpPr>
+        <a:xfrm>
+          <a:off x="0" y="0"/>
+          <a:ext cx="0" cy="0"/>
+          <a:chOff x="0" y="0"/>
+          <a:chExt cx="0" cy="0"/>
+        </a:xfrm>
+      </p:grpSpPr>
+      <p:sp>
+        <p:nvSpPr>
+          <p:cNvPr id="2" name="Title 1">
+            <a:extLst>
+              <a:ext uri="{FF2B5EF4-FFF2-40B4-BE49-F238E27FC236}">
+                <a16:creationId xmlns:a16="http://schemas.microsoft.com/office/drawing/2014/main" id="{2A0147AC-C023-440A-34F9-A54F61B3D0E0}"/>
+              </a:ext>
+            </a:extLst>
+          </p:cNvPr>
+          <p:cNvSpPr>
+            <a:spLocks noGrp="1"/>
+          </p:cNvSpPr>
+          <p:nvPr>
+            <p:ph type="title"/>
+          </p:nvPr>
+        </p:nvSpPr>
+        <p:spPr/>
+        <p:txBody>
+          <a:bodyPr/>
+          <a:lstStyle/>
+          <a:p>
+            <a:r>
+              <a:rPr lang="en-US" dirty="0"/>
+              <a:t>Case for kernel extensions</a:t>
+            </a:r>
+          </a:p>
+        </p:txBody>
+      </p:sp>
+      <p:sp>
+        <p:nvSpPr>
+          <p:cNvPr id="3" name="Content Placeholder 2">
+            <a:extLst>
+              <a:ext uri="{FF2B5EF4-FFF2-40B4-BE49-F238E27FC236}">
+                <a16:creationId xmlns:a16="http://schemas.microsoft.com/office/drawing/2014/main" id="{467E6C74-80C3-1DAC-7850-6D0ACC8F4ADB}"/>
+              </a:ext>
+            </a:extLst>
+          </p:cNvPr>
+          <p:cNvSpPr>
+            <a:spLocks noGrp="1"/>
+          </p:cNvSpPr>
+          <p:nvPr>
+            <p:ph idx="1"/>
+          </p:nvPr>
+        </p:nvSpPr>
+        <p:spPr/>
+        <p:txBody>
+          <a:bodyPr/>
+          <a:lstStyle/>
+          <a:p>
+            <a:pPr marL="0" indent="0">
+              <a:buNone/>
+            </a:pPr>
+            <a:r>
+              <a:rPr lang="en-US" dirty="0"/>
+              <a:t>Requirement</a:t>
+            </a:r>
+          </a:p>
+          <a:p>
+            <a:pPr lvl="1"/>
+            <a:r>
+              <a:rPr lang="en-US" dirty="0"/>
+              <a:t>Standalone Rust programs: cannot use </a:t>
+            </a:r>
+            <a:r>
+              <a:rPr lang="en-US" dirty="0" err="1"/>
+              <a:t>userspace</a:t>
+            </a:r>
+            <a:r>
+              <a:rPr lang="en-US" dirty="0"/>
+              <a:t> </a:t>
+            </a:r>
+            <a:r>
+              <a:rPr lang="en-US" dirty="0" err="1"/>
+              <a:t>libunwind</a:t>
+            </a:r>
+            <a:endParaRPr lang="en-US" dirty="0"/>
+          </a:p>
+          <a:p>
+            <a:pPr lvl="1"/>
+            <a:r>
+              <a:rPr lang="en-US" dirty="0"/>
+              <a:t>Possible attach point in interrupts: cannot perform allocation</a:t>
+            </a:r>
+          </a:p>
+          <a:p>
+            <a:pPr lvl="1"/>
+            <a:r>
+              <a:rPr lang="en-US" dirty="0"/>
+              <a:t>Should not unwind into kernel itself</a:t>
+            </a:r>
+          </a:p>
+          <a:p>
+            <a:pPr lvl="1"/>
+            <a:r>
+              <a:rPr lang="en-US" dirty="0"/>
+              <a:t>Protect against custom, untrusted destructor (</a:t>
+            </a:r>
+            <a:r>
+              <a:rPr lang="en-US" sz="2200" dirty="0">
+                <a:latin typeface="Consolas" panose="020B0609020204030204" pitchFamily="49" charset="0"/>
+                <a:cs typeface="Consolas" panose="020B0609020204030204" pitchFamily="49" charset="0"/>
+              </a:rPr>
+              <a:t>Drop</a:t>
+            </a:r>
+            <a:r>
+              <a:rPr lang="en-US" dirty="0"/>
+              <a:t> trait in Rust)</a:t>
+            </a:r>
+          </a:p>
+          <a:p>
+            <a:pPr marL="0" indent="0">
+              <a:buNone/>
+            </a:pPr>
+            <a:r>
+              <a:rPr lang="en-US" dirty="0"/>
+              <a:t>Difference </a:t>
+            </a:r>
+            <a:r>
+              <a:rPr lang="en-US" dirty="0" err="1"/>
+              <a:t>v.s</a:t>
+            </a:r>
+            <a:r>
+              <a:rPr lang="en-US" dirty="0"/>
+              <a:t>. other in-kernel Rust frameworks</a:t>
+            </a:r>
+          </a:p>
+          <a:p>
+            <a:pPr lvl="1"/>
+            <a:r>
+              <a:rPr lang="en-US" dirty="0"/>
+              <a:t>Rust for Linux: directly links Rust panic to kernel panic w/o cleanup</a:t>
+            </a:r>
+          </a:p>
+          <a:p>
+            <a:pPr lvl="1"/>
+            <a:r>
+              <a:rPr lang="en-US" dirty="0"/>
+              <a:t>Theseus: does not account for bad </a:t>
+            </a:r>
+            <a:r>
+              <a:rPr lang="en-US" sz="2200" dirty="0">
+                <a:latin typeface="Consolas" panose="020B0609020204030204" pitchFamily="49" charset="0"/>
+                <a:cs typeface="Consolas" panose="020B0609020204030204" pitchFamily="49" charset="0"/>
+              </a:rPr>
+              <a:t>Drop</a:t>
+            </a:r>
+            <a:r>
+              <a:rPr lang="en-US" dirty="0"/>
+              <a:t> implementation, requires allocation, but a good starting point</a:t>
+            </a:r>
+          </a:p>
+          <a:p>
+            <a:pPr lvl="2"/>
+            <a:r>
+              <a:rPr lang="en-US" dirty="0"/>
+              <a:t>side note, allocating the exception context can probably be defined as per-</a:t>
+            </a:r>
+            <a:r>
+              <a:rPr lang="en-US" dirty="0" err="1"/>
+              <a:t>cpu</a:t>
+            </a:r>
+            <a:r>
+              <a:rPr lang="en-US" dirty="0"/>
+              <a:t> to avoid </a:t>
+            </a:r>
+            <a:r>
+              <a:rPr lang="en-US"/>
+              <a:t>dynamic allocation</a:t>
+            </a:r>
+            <a:endParaRPr lang="en-US" dirty="0"/>
+          </a:p>
+        </p:txBody>
+      </p:sp>
+    </p:spTree>
+    <p:extLst>
+      <p:ext uri="{BB962C8B-B14F-4D97-AF65-F5344CB8AC3E}">
+        <p14:creationId xmlns:p14="http://schemas.microsoft.com/office/powerpoint/2010/main" val="3110050502"/>
+      </p:ext>
+    </p:extLst>
+  </p:cSld>
+  <p:clrMapOvr>
+    <a:masterClrMapping/>
+  </p:clrMapOvr>
 </p:sld>
 </file>
 

</xml_diff>